<commit_message>
Modify wireframe workflow, Activity flow
</commit_message>
<xml_diff>
--- a/doc/wireframe/[MoaYo]wireframe_workflow.pptx
+++ b/doc/wireframe/[MoaYo]wireframe_workflow.pptx
@@ -132,7 +132,7 @@
           <p:cNvPr id="2" name="제목 1">
             <a:extLst>
               <a:ext uri="{FF2B5EF4-FFF2-40B4-BE49-F238E27FC236}">
-                <a16:creationId xmlns:a16="http://schemas.microsoft.com/office/drawing/2014/main" id="{FB15F1F9-3ACC-4E7F-995D-6AAB2C719D6F}"/>
+                <a16:creationId xmlns="" xmlns:a16="http://schemas.microsoft.com/office/drawing/2014/main" id="{FB15F1F9-3ACC-4E7F-995D-6AAB2C719D6F}"/>
               </a:ext>
             </a:extLst>
           </p:cNvPr>
@@ -169,7 +169,7 @@
           <p:cNvPr id="3" name="부제목 2">
             <a:extLst>
               <a:ext uri="{FF2B5EF4-FFF2-40B4-BE49-F238E27FC236}">
-                <a16:creationId xmlns:a16="http://schemas.microsoft.com/office/drawing/2014/main" id="{C23E519F-7351-4F05-BA94-87A95A30ACD0}"/>
+                <a16:creationId xmlns="" xmlns:a16="http://schemas.microsoft.com/office/drawing/2014/main" id="{C23E519F-7351-4F05-BA94-87A95A30ACD0}"/>
               </a:ext>
             </a:extLst>
           </p:cNvPr>
@@ -239,7 +239,7 @@
           <p:cNvPr id="4" name="날짜 개체 틀 3">
             <a:extLst>
               <a:ext uri="{FF2B5EF4-FFF2-40B4-BE49-F238E27FC236}">
-                <a16:creationId xmlns:a16="http://schemas.microsoft.com/office/drawing/2014/main" id="{42A5F15E-EB36-4262-AF5D-290964CADDD0}"/>
+                <a16:creationId xmlns="" xmlns:a16="http://schemas.microsoft.com/office/drawing/2014/main" id="{42A5F15E-EB36-4262-AF5D-290964CADDD0}"/>
               </a:ext>
             </a:extLst>
           </p:cNvPr>
@@ -257,7 +257,7 @@
           <a:p>
             <a:fld id="{AA6C62C0-D1AE-4FAF-BD5C-5F55576AE54B}" type="datetimeFigureOut">
               <a:rPr lang="ko-KR" altLang="en-US" smtClean="0"/>
-              <a:t>2020-03-24</a:t>
+              <a:t>2020-04-16</a:t>
             </a:fld>
             <a:endParaRPr lang="ko-KR" altLang="en-US"/>
           </a:p>
@@ -268,7 +268,7 @@
           <p:cNvPr id="5" name="바닥글 개체 틀 4">
             <a:extLst>
               <a:ext uri="{FF2B5EF4-FFF2-40B4-BE49-F238E27FC236}">
-                <a16:creationId xmlns:a16="http://schemas.microsoft.com/office/drawing/2014/main" id="{1ED127A8-7551-4B3F-B15D-44C4F1D28D1B}"/>
+                <a16:creationId xmlns="" xmlns:a16="http://schemas.microsoft.com/office/drawing/2014/main" id="{1ED127A8-7551-4B3F-B15D-44C4F1D28D1B}"/>
               </a:ext>
             </a:extLst>
           </p:cNvPr>
@@ -293,7 +293,7 @@
           <p:cNvPr id="6" name="슬라이드 번호 개체 틀 5">
             <a:extLst>
               <a:ext uri="{FF2B5EF4-FFF2-40B4-BE49-F238E27FC236}">
-                <a16:creationId xmlns:a16="http://schemas.microsoft.com/office/drawing/2014/main" id="{60CA8DA0-D9A2-44AC-8C13-EC519C2D84A5}"/>
+                <a16:creationId xmlns="" xmlns:a16="http://schemas.microsoft.com/office/drawing/2014/main" id="{60CA8DA0-D9A2-44AC-8C13-EC519C2D84A5}"/>
               </a:ext>
             </a:extLst>
           </p:cNvPr>
@@ -352,7 +352,7 @@
           <p:cNvPr id="2" name="제목 1">
             <a:extLst>
               <a:ext uri="{FF2B5EF4-FFF2-40B4-BE49-F238E27FC236}">
-                <a16:creationId xmlns:a16="http://schemas.microsoft.com/office/drawing/2014/main" id="{A6B71644-6D64-4477-AB49-344780DA5EFE}"/>
+                <a16:creationId xmlns="" xmlns:a16="http://schemas.microsoft.com/office/drawing/2014/main" id="{A6B71644-6D64-4477-AB49-344780DA5EFE}"/>
               </a:ext>
             </a:extLst>
           </p:cNvPr>
@@ -380,7 +380,7 @@
           <p:cNvPr id="3" name="세로 텍스트 개체 틀 2">
             <a:extLst>
               <a:ext uri="{FF2B5EF4-FFF2-40B4-BE49-F238E27FC236}">
-                <a16:creationId xmlns:a16="http://schemas.microsoft.com/office/drawing/2014/main" id="{D7EFC3AD-DF4C-4486-AD38-287B9178EB99}"/>
+                <a16:creationId xmlns="" xmlns:a16="http://schemas.microsoft.com/office/drawing/2014/main" id="{D7EFC3AD-DF4C-4486-AD38-287B9178EB99}"/>
               </a:ext>
             </a:extLst>
           </p:cNvPr>
@@ -437,7 +437,7 @@
           <p:cNvPr id="4" name="날짜 개체 틀 3">
             <a:extLst>
               <a:ext uri="{FF2B5EF4-FFF2-40B4-BE49-F238E27FC236}">
-                <a16:creationId xmlns:a16="http://schemas.microsoft.com/office/drawing/2014/main" id="{1B987F1F-4998-439B-AD5B-3B5CD7253CCC}"/>
+                <a16:creationId xmlns="" xmlns:a16="http://schemas.microsoft.com/office/drawing/2014/main" id="{1B987F1F-4998-439B-AD5B-3B5CD7253CCC}"/>
               </a:ext>
             </a:extLst>
           </p:cNvPr>
@@ -455,7 +455,7 @@
           <a:p>
             <a:fld id="{AA6C62C0-D1AE-4FAF-BD5C-5F55576AE54B}" type="datetimeFigureOut">
               <a:rPr lang="ko-KR" altLang="en-US" smtClean="0"/>
-              <a:t>2020-03-24</a:t>
+              <a:t>2020-04-16</a:t>
             </a:fld>
             <a:endParaRPr lang="ko-KR" altLang="en-US"/>
           </a:p>
@@ -466,7 +466,7 @@
           <p:cNvPr id="5" name="바닥글 개체 틀 4">
             <a:extLst>
               <a:ext uri="{FF2B5EF4-FFF2-40B4-BE49-F238E27FC236}">
-                <a16:creationId xmlns:a16="http://schemas.microsoft.com/office/drawing/2014/main" id="{1809AB3C-B585-4792-B547-C39C40EAA613}"/>
+                <a16:creationId xmlns="" xmlns:a16="http://schemas.microsoft.com/office/drawing/2014/main" id="{1809AB3C-B585-4792-B547-C39C40EAA613}"/>
               </a:ext>
             </a:extLst>
           </p:cNvPr>
@@ -491,7 +491,7 @@
           <p:cNvPr id="6" name="슬라이드 번호 개체 틀 5">
             <a:extLst>
               <a:ext uri="{FF2B5EF4-FFF2-40B4-BE49-F238E27FC236}">
-                <a16:creationId xmlns:a16="http://schemas.microsoft.com/office/drawing/2014/main" id="{5AB4E83B-C4A8-4DED-B3A4-8E475CCC0A83}"/>
+                <a16:creationId xmlns="" xmlns:a16="http://schemas.microsoft.com/office/drawing/2014/main" id="{5AB4E83B-C4A8-4DED-B3A4-8E475CCC0A83}"/>
               </a:ext>
             </a:extLst>
           </p:cNvPr>
@@ -550,7 +550,7 @@
           <p:cNvPr id="2" name="세로 제목 1">
             <a:extLst>
               <a:ext uri="{FF2B5EF4-FFF2-40B4-BE49-F238E27FC236}">
-                <a16:creationId xmlns:a16="http://schemas.microsoft.com/office/drawing/2014/main" id="{1F140F4D-405C-40EF-9790-701AA456C1BF}"/>
+                <a16:creationId xmlns="" xmlns:a16="http://schemas.microsoft.com/office/drawing/2014/main" id="{1F140F4D-405C-40EF-9790-701AA456C1BF}"/>
               </a:ext>
             </a:extLst>
           </p:cNvPr>
@@ -583,7 +583,7 @@
           <p:cNvPr id="3" name="세로 텍스트 개체 틀 2">
             <a:extLst>
               <a:ext uri="{FF2B5EF4-FFF2-40B4-BE49-F238E27FC236}">
-                <a16:creationId xmlns:a16="http://schemas.microsoft.com/office/drawing/2014/main" id="{6D963058-3E2C-4ACF-903C-F5061DEE3336}"/>
+                <a16:creationId xmlns="" xmlns:a16="http://schemas.microsoft.com/office/drawing/2014/main" id="{6D963058-3E2C-4ACF-903C-F5061DEE3336}"/>
               </a:ext>
             </a:extLst>
           </p:cNvPr>
@@ -645,7 +645,7 @@
           <p:cNvPr id="4" name="날짜 개체 틀 3">
             <a:extLst>
               <a:ext uri="{FF2B5EF4-FFF2-40B4-BE49-F238E27FC236}">
-                <a16:creationId xmlns:a16="http://schemas.microsoft.com/office/drawing/2014/main" id="{3C1A6565-59BE-471C-9F75-877E91C34999}"/>
+                <a16:creationId xmlns="" xmlns:a16="http://schemas.microsoft.com/office/drawing/2014/main" id="{3C1A6565-59BE-471C-9F75-877E91C34999}"/>
               </a:ext>
             </a:extLst>
           </p:cNvPr>
@@ -663,7 +663,7 @@
           <a:p>
             <a:fld id="{AA6C62C0-D1AE-4FAF-BD5C-5F55576AE54B}" type="datetimeFigureOut">
               <a:rPr lang="ko-KR" altLang="en-US" smtClean="0"/>
-              <a:t>2020-03-24</a:t>
+              <a:t>2020-04-16</a:t>
             </a:fld>
             <a:endParaRPr lang="ko-KR" altLang="en-US"/>
           </a:p>
@@ -674,7 +674,7 @@
           <p:cNvPr id="5" name="바닥글 개체 틀 4">
             <a:extLst>
               <a:ext uri="{FF2B5EF4-FFF2-40B4-BE49-F238E27FC236}">
-                <a16:creationId xmlns:a16="http://schemas.microsoft.com/office/drawing/2014/main" id="{4FFD26B3-4622-4BF1-BD1A-E4777E1FDA36}"/>
+                <a16:creationId xmlns="" xmlns:a16="http://schemas.microsoft.com/office/drawing/2014/main" id="{4FFD26B3-4622-4BF1-BD1A-E4777E1FDA36}"/>
               </a:ext>
             </a:extLst>
           </p:cNvPr>
@@ -699,7 +699,7 @@
           <p:cNvPr id="6" name="슬라이드 번호 개체 틀 5">
             <a:extLst>
               <a:ext uri="{FF2B5EF4-FFF2-40B4-BE49-F238E27FC236}">
-                <a16:creationId xmlns:a16="http://schemas.microsoft.com/office/drawing/2014/main" id="{ED67DAA8-6EDC-4427-A3F7-56D690C19053}"/>
+                <a16:creationId xmlns="" xmlns:a16="http://schemas.microsoft.com/office/drawing/2014/main" id="{ED67DAA8-6EDC-4427-A3F7-56D690C19053}"/>
               </a:ext>
             </a:extLst>
           </p:cNvPr>
@@ -758,7 +758,7 @@
           <p:cNvPr id="2" name="제목 1">
             <a:extLst>
               <a:ext uri="{FF2B5EF4-FFF2-40B4-BE49-F238E27FC236}">
-                <a16:creationId xmlns:a16="http://schemas.microsoft.com/office/drawing/2014/main" id="{B5071346-160D-460D-BDEF-60EE4E272154}"/>
+                <a16:creationId xmlns="" xmlns:a16="http://schemas.microsoft.com/office/drawing/2014/main" id="{B5071346-160D-460D-BDEF-60EE4E272154}"/>
               </a:ext>
             </a:extLst>
           </p:cNvPr>
@@ -786,7 +786,7 @@
           <p:cNvPr id="3" name="내용 개체 틀 2">
             <a:extLst>
               <a:ext uri="{FF2B5EF4-FFF2-40B4-BE49-F238E27FC236}">
-                <a16:creationId xmlns:a16="http://schemas.microsoft.com/office/drawing/2014/main" id="{318DEB6E-63AF-4231-B05E-1575EC6A6EB4}"/>
+                <a16:creationId xmlns="" xmlns:a16="http://schemas.microsoft.com/office/drawing/2014/main" id="{318DEB6E-63AF-4231-B05E-1575EC6A6EB4}"/>
               </a:ext>
             </a:extLst>
           </p:cNvPr>
@@ -843,7 +843,7 @@
           <p:cNvPr id="4" name="날짜 개체 틀 3">
             <a:extLst>
               <a:ext uri="{FF2B5EF4-FFF2-40B4-BE49-F238E27FC236}">
-                <a16:creationId xmlns:a16="http://schemas.microsoft.com/office/drawing/2014/main" id="{55A037C5-6F78-4F7C-AA1E-8AB659950DE5}"/>
+                <a16:creationId xmlns="" xmlns:a16="http://schemas.microsoft.com/office/drawing/2014/main" id="{55A037C5-6F78-4F7C-AA1E-8AB659950DE5}"/>
               </a:ext>
             </a:extLst>
           </p:cNvPr>
@@ -861,7 +861,7 @@
           <a:p>
             <a:fld id="{AA6C62C0-D1AE-4FAF-BD5C-5F55576AE54B}" type="datetimeFigureOut">
               <a:rPr lang="ko-KR" altLang="en-US" smtClean="0"/>
-              <a:t>2020-03-24</a:t>
+              <a:t>2020-04-16</a:t>
             </a:fld>
             <a:endParaRPr lang="ko-KR" altLang="en-US"/>
           </a:p>
@@ -872,7 +872,7 @@
           <p:cNvPr id="5" name="바닥글 개체 틀 4">
             <a:extLst>
               <a:ext uri="{FF2B5EF4-FFF2-40B4-BE49-F238E27FC236}">
-                <a16:creationId xmlns:a16="http://schemas.microsoft.com/office/drawing/2014/main" id="{7596D527-7B6F-43B6-9BBA-FAA397F77184}"/>
+                <a16:creationId xmlns="" xmlns:a16="http://schemas.microsoft.com/office/drawing/2014/main" id="{7596D527-7B6F-43B6-9BBA-FAA397F77184}"/>
               </a:ext>
             </a:extLst>
           </p:cNvPr>
@@ -897,7 +897,7 @@
           <p:cNvPr id="6" name="슬라이드 번호 개체 틀 5">
             <a:extLst>
               <a:ext uri="{FF2B5EF4-FFF2-40B4-BE49-F238E27FC236}">
-                <a16:creationId xmlns:a16="http://schemas.microsoft.com/office/drawing/2014/main" id="{847CC6C7-CACF-4C8D-AFC5-C9CA5C68B09A}"/>
+                <a16:creationId xmlns="" xmlns:a16="http://schemas.microsoft.com/office/drawing/2014/main" id="{847CC6C7-CACF-4C8D-AFC5-C9CA5C68B09A}"/>
               </a:ext>
             </a:extLst>
           </p:cNvPr>
@@ -956,7 +956,7 @@
           <p:cNvPr id="2" name="제목 1">
             <a:extLst>
               <a:ext uri="{FF2B5EF4-FFF2-40B4-BE49-F238E27FC236}">
-                <a16:creationId xmlns:a16="http://schemas.microsoft.com/office/drawing/2014/main" id="{70F4DEC7-B0E3-4EE3-AD35-D27CCBFE11CF}"/>
+                <a16:creationId xmlns="" xmlns:a16="http://schemas.microsoft.com/office/drawing/2014/main" id="{70F4DEC7-B0E3-4EE3-AD35-D27CCBFE11CF}"/>
               </a:ext>
             </a:extLst>
           </p:cNvPr>
@@ -993,7 +993,7 @@
           <p:cNvPr id="3" name="텍스트 개체 틀 2">
             <a:extLst>
               <a:ext uri="{FF2B5EF4-FFF2-40B4-BE49-F238E27FC236}">
-                <a16:creationId xmlns:a16="http://schemas.microsoft.com/office/drawing/2014/main" id="{E710072F-D64F-4303-A446-B3680F0061F5}"/>
+                <a16:creationId xmlns="" xmlns:a16="http://schemas.microsoft.com/office/drawing/2014/main" id="{E710072F-D64F-4303-A446-B3680F0061F5}"/>
               </a:ext>
             </a:extLst>
           </p:cNvPr>
@@ -1118,7 +1118,7 @@
           <p:cNvPr id="4" name="날짜 개체 틀 3">
             <a:extLst>
               <a:ext uri="{FF2B5EF4-FFF2-40B4-BE49-F238E27FC236}">
-                <a16:creationId xmlns:a16="http://schemas.microsoft.com/office/drawing/2014/main" id="{01192CBD-38B6-4D91-A4D3-AC7C126C68CC}"/>
+                <a16:creationId xmlns="" xmlns:a16="http://schemas.microsoft.com/office/drawing/2014/main" id="{01192CBD-38B6-4D91-A4D3-AC7C126C68CC}"/>
               </a:ext>
             </a:extLst>
           </p:cNvPr>
@@ -1136,7 +1136,7 @@
           <a:p>
             <a:fld id="{AA6C62C0-D1AE-4FAF-BD5C-5F55576AE54B}" type="datetimeFigureOut">
               <a:rPr lang="ko-KR" altLang="en-US" smtClean="0"/>
-              <a:t>2020-03-24</a:t>
+              <a:t>2020-04-16</a:t>
             </a:fld>
             <a:endParaRPr lang="ko-KR" altLang="en-US"/>
           </a:p>
@@ -1147,7 +1147,7 @@
           <p:cNvPr id="5" name="바닥글 개체 틀 4">
             <a:extLst>
               <a:ext uri="{FF2B5EF4-FFF2-40B4-BE49-F238E27FC236}">
-                <a16:creationId xmlns:a16="http://schemas.microsoft.com/office/drawing/2014/main" id="{EE6C1B23-7C6F-436D-9FD8-807D66A21AB2}"/>
+                <a16:creationId xmlns="" xmlns:a16="http://schemas.microsoft.com/office/drawing/2014/main" id="{EE6C1B23-7C6F-436D-9FD8-807D66A21AB2}"/>
               </a:ext>
             </a:extLst>
           </p:cNvPr>
@@ -1172,7 +1172,7 @@
           <p:cNvPr id="6" name="슬라이드 번호 개체 틀 5">
             <a:extLst>
               <a:ext uri="{FF2B5EF4-FFF2-40B4-BE49-F238E27FC236}">
-                <a16:creationId xmlns:a16="http://schemas.microsoft.com/office/drawing/2014/main" id="{E015A3E9-D12E-4D81-906E-E96ECE48C211}"/>
+                <a16:creationId xmlns="" xmlns:a16="http://schemas.microsoft.com/office/drawing/2014/main" id="{E015A3E9-D12E-4D81-906E-E96ECE48C211}"/>
               </a:ext>
             </a:extLst>
           </p:cNvPr>
@@ -1231,7 +1231,7 @@
           <p:cNvPr id="2" name="제목 1">
             <a:extLst>
               <a:ext uri="{FF2B5EF4-FFF2-40B4-BE49-F238E27FC236}">
-                <a16:creationId xmlns:a16="http://schemas.microsoft.com/office/drawing/2014/main" id="{AACB5979-D2E7-4682-A01E-55703F5978B0}"/>
+                <a16:creationId xmlns="" xmlns:a16="http://schemas.microsoft.com/office/drawing/2014/main" id="{AACB5979-D2E7-4682-A01E-55703F5978B0}"/>
               </a:ext>
             </a:extLst>
           </p:cNvPr>
@@ -1259,7 +1259,7 @@
           <p:cNvPr id="3" name="내용 개체 틀 2">
             <a:extLst>
               <a:ext uri="{FF2B5EF4-FFF2-40B4-BE49-F238E27FC236}">
-                <a16:creationId xmlns:a16="http://schemas.microsoft.com/office/drawing/2014/main" id="{540B7018-9432-4182-A315-D4FF46ECA41E}"/>
+                <a16:creationId xmlns="" xmlns:a16="http://schemas.microsoft.com/office/drawing/2014/main" id="{540B7018-9432-4182-A315-D4FF46ECA41E}"/>
               </a:ext>
             </a:extLst>
           </p:cNvPr>
@@ -1321,7 +1321,7 @@
           <p:cNvPr id="4" name="내용 개체 틀 3">
             <a:extLst>
               <a:ext uri="{FF2B5EF4-FFF2-40B4-BE49-F238E27FC236}">
-                <a16:creationId xmlns:a16="http://schemas.microsoft.com/office/drawing/2014/main" id="{EEE41878-95F2-41C7-9CBA-3CB445920727}"/>
+                <a16:creationId xmlns="" xmlns:a16="http://schemas.microsoft.com/office/drawing/2014/main" id="{EEE41878-95F2-41C7-9CBA-3CB445920727}"/>
               </a:ext>
             </a:extLst>
           </p:cNvPr>
@@ -1383,7 +1383,7 @@
           <p:cNvPr id="5" name="날짜 개체 틀 4">
             <a:extLst>
               <a:ext uri="{FF2B5EF4-FFF2-40B4-BE49-F238E27FC236}">
-                <a16:creationId xmlns:a16="http://schemas.microsoft.com/office/drawing/2014/main" id="{B86D1B90-2AF2-467E-9BD7-2A7440A8AEB6}"/>
+                <a16:creationId xmlns="" xmlns:a16="http://schemas.microsoft.com/office/drawing/2014/main" id="{B86D1B90-2AF2-467E-9BD7-2A7440A8AEB6}"/>
               </a:ext>
             </a:extLst>
           </p:cNvPr>
@@ -1401,7 +1401,7 @@
           <a:p>
             <a:fld id="{AA6C62C0-D1AE-4FAF-BD5C-5F55576AE54B}" type="datetimeFigureOut">
               <a:rPr lang="ko-KR" altLang="en-US" smtClean="0"/>
-              <a:t>2020-03-24</a:t>
+              <a:t>2020-04-16</a:t>
             </a:fld>
             <a:endParaRPr lang="ko-KR" altLang="en-US"/>
           </a:p>
@@ -1412,7 +1412,7 @@
           <p:cNvPr id="6" name="바닥글 개체 틀 5">
             <a:extLst>
               <a:ext uri="{FF2B5EF4-FFF2-40B4-BE49-F238E27FC236}">
-                <a16:creationId xmlns:a16="http://schemas.microsoft.com/office/drawing/2014/main" id="{E628CF0A-0ECB-4000-A88B-4929458BE605}"/>
+                <a16:creationId xmlns="" xmlns:a16="http://schemas.microsoft.com/office/drawing/2014/main" id="{E628CF0A-0ECB-4000-A88B-4929458BE605}"/>
               </a:ext>
             </a:extLst>
           </p:cNvPr>
@@ -1437,7 +1437,7 @@
           <p:cNvPr id="7" name="슬라이드 번호 개체 틀 6">
             <a:extLst>
               <a:ext uri="{FF2B5EF4-FFF2-40B4-BE49-F238E27FC236}">
-                <a16:creationId xmlns:a16="http://schemas.microsoft.com/office/drawing/2014/main" id="{1F4AFBFB-9DC4-4222-864B-4E79487D6AAD}"/>
+                <a16:creationId xmlns="" xmlns:a16="http://schemas.microsoft.com/office/drawing/2014/main" id="{1F4AFBFB-9DC4-4222-864B-4E79487D6AAD}"/>
               </a:ext>
             </a:extLst>
           </p:cNvPr>
@@ -1496,7 +1496,7 @@
           <p:cNvPr id="2" name="제목 1">
             <a:extLst>
               <a:ext uri="{FF2B5EF4-FFF2-40B4-BE49-F238E27FC236}">
-                <a16:creationId xmlns:a16="http://schemas.microsoft.com/office/drawing/2014/main" id="{BCD1D9EA-8D6A-4259-9BDB-DE0D61505647}"/>
+                <a16:creationId xmlns="" xmlns:a16="http://schemas.microsoft.com/office/drawing/2014/main" id="{BCD1D9EA-8D6A-4259-9BDB-DE0D61505647}"/>
               </a:ext>
             </a:extLst>
           </p:cNvPr>
@@ -1529,7 +1529,7 @@
           <p:cNvPr id="3" name="텍스트 개체 틀 2">
             <a:extLst>
               <a:ext uri="{FF2B5EF4-FFF2-40B4-BE49-F238E27FC236}">
-                <a16:creationId xmlns:a16="http://schemas.microsoft.com/office/drawing/2014/main" id="{6DA7B630-A81F-4DEC-83E7-EF93AD2119BE}"/>
+                <a16:creationId xmlns="" xmlns:a16="http://schemas.microsoft.com/office/drawing/2014/main" id="{6DA7B630-A81F-4DEC-83E7-EF93AD2119BE}"/>
               </a:ext>
             </a:extLst>
           </p:cNvPr>
@@ -1600,7 +1600,7 @@
           <p:cNvPr id="4" name="내용 개체 틀 3">
             <a:extLst>
               <a:ext uri="{FF2B5EF4-FFF2-40B4-BE49-F238E27FC236}">
-                <a16:creationId xmlns:a16="http://schemas.microsoft.com/office/drawing/2014/main" id="{D9C7CE69-F026-4C53-A4FB-A5CC91526F9C}"/>
+                <a16:creationId xmlns="" xmlns:a16="http://schemas.microsoft.com/office/drawing/2014/main" id="{D9C7CE69-F026-4C53-A4FB-A5CC91526F9C}"/>
               </a:ext>
             </a:extLst>
           </p:cNvPr>
@@ -1662,7 +1662,7 @@
           <p:cNvPr id="5" name="텍스트 개체 틀 4">
             <a:extLst>
               <a:ext uri="{FF2B5EF4-FFF2-40B4-BE49-F238E27FC236}">
-                <a16:creationId xmlns:a16="http://schemas.microsoft.com/office/drawing/2014/main" id="{0CFCBB2F-534F-44E2-B2E6-25CAB9EA92E9}"/>
+                <a16:creationId xmlns="" xmlns:a16="http://schemas.microsoft.com/office/drawing/2014/main" id="{0CFCBB2F-534F-44E2-B2E6-25CAB9EA92E9}"/>
               </a:ext>
             </a:extLst>
           </p:cNvPr>
@@ -1733,7 +1733,7 @@
           <p:cNvPr id="6" name="내용 개체 틀 5">
             <a:extLst>
               <a:ext uri="{FF2B5EF4-FFF2-40B4-BE49-F238E27FC236}">
-                <a16:creationId xmlns:a16="http://schemas.microsoft.com/office/drawing/2014/main" id="{88373652-3529-446B-9E48-8F421EDE24FA}"/>
+                <a16:creationId xmlns="" xmlns:a16="http://schemas.microsoft.com/office/drawing/2014/main" id="{88373652-3529-446B-9E48-8F421EDE24FA}"/>
               </a:ext>
             </a:extLst>
           </p:cNvPr>
@@ -1795,7 +1795,7 @@
           <p:cNvPr id="7" name="날짜 개체 틀 6">
             <a:extLst>
               <a:ext uri="{FF2B5EF4-FFF2-40B4-BE49-F238E27FC236}">
-                <a16:creationId xmlns:a16="http://schemas.microsoft.com/office/drawing/2014/main" id="{AAB7E436-1DAB-4E7E-8141-258C56A0472F}"/>
+                <a16:creationId xmlns="" xmlns:a16="http://schemas.microsoft.com/office/drawing/2014/main" id="{AAB7E436-1DAB-4E7E-8141-258C56A0472F}"/>
               </a:ext>
             </a:extLst>
           </p:cNvPr>
@@ -1813,7 +1813,7 @@
           <a:p>
             <a:fld id="{AA6C62C0-D1AE-4FAF-BD5C-5F55576AE54B}" type="datetimeFigureOut">
               <a:rPr lang="ko-KR" altLang="en-US" smtClean="0"/>
-              <a:t>2020-03-24</a:t>
+              <a:t>2020-04-16</a:t>
             </a:fld>
             <a:endParaRPr lang="ko-KR" altLang="en-US"/>
           </a:p>
@@ -1824,7 +1824,7 @@
           <p:cNvPr id="8" name="바닥글 개체 틀 7">
             <a:extLst>
               <a:ext uri="{FF2B5EF4-FFF2-40B4-BE49-F238E27FC236}">
-                <a16:creationId xmlns:a16="http://schemas.microsoft.com/office/drawing/2014/main" id="{55782CAD-4B77-432E-8645-176879FC2243}"/>
+                <a16:creationId xmlns="" xmlns:a16="http://schemas.microsoft.com/office/drawing/2014/main" id="{55782CAD-4B77-432E-8645-176879FC2243}"/>
               </a:ext>
             </a:extLst>
           </p:cNvPr>
@@ -1849,7 +1849,7 @@
           <p:cNvPr id="9" name="슬라이드 번호 개체 틀 8">
             <a:extLst>
               <a:ext uri="{FF2B5EF4-FFF2-40B4-BE49-F238E27FC236}">
-                <a16:creationId xmlns:a16="http://schemas.microsoft.com/office/drawing/2014/main" id="{6FEAABD2-BCE2-4CB9-A81F-F6AE51C35D4D}"/>
+                <a16:creationId xmlns="" xmlns:a16="http://schemas.microsoft.com/office/drawing/2014/main" id="{6FEAABD2-BCE2-4CB9-A81F-F6AE51C35D4D}"/>
               </a:ext>
             </a:extLst>
           </p:cNvPr>
@@ -1908,7 +1908,7 @@
           <p:cNvPr id="2" name="제목 1">
             <a:extLst>
               <a:ext uri="{FF2B5EF4-FFF2-40B4-BE49-F238E27FC236}">
-                <a16:creationId xmlns:a16="http://schemas.microsoft.com/office/drawing/2014/main" id="{F154F3DB-8230-4A32-96A7-A94FC2838611}"/>
+                <a16:creationId xmlns="" xmlns:a16="http://schemas.microsoft.com/office/drawing/2014/main" id="{F154F3DB-8230-4A32-96A7-A94FC2838611}"/>
               </a:ext>
             </a:extLst>
           </p:cNvPr>
@@ -1936,7 +1936,7 @@
           <p:cNvPr id="3" name="날짜 개체 틀 2">
             <a:extLst>
               <a:ext uri="{FF2B5EF4-FFF2-40B4-BE49-F238E27FC236}">
-                <a16:creationId xmlns:a16="http://schemas.microsoft.com/office/drawing/2014/main" id="{76116320-3FCD-4DED-91FE-4C28E17490FA}"/>
+                <a16:creationId xmlns="" xmlns:a16="http://schemas.microsoft.com/office/drawing/2014/main" id="{76116320-3FCD-4DED-91FE-4C28E17490FA}"/>
               </a:ext>
             </a:extLst>
           </p:cNvPr>
@@ -1954,7 +1954,7 @@
           <a:p>
             <a:fld id="{AA6C62C0-D1AE-4FAF-BD5C-5F55576AE54B}" type="datetimeFigureOut">
               <a:rPr lang="ko-KR" altLang="en-US" smtClean="0"/>
-              <a:t>2020-03-24</a:t>
+              <a:t>2020-04-16</a:t>
             </a:fld>
             <a:endParaRPr lang="ko-KR" altLang="en-US"/>
           </a:p>
@@ -1965,7 +1965,7 @@
           <p:cNvPr id="4" name="바닥글 개체 틀 3">
             <a:extLst>
               <a:ext uri="{FF2B5EF4-FFF2-40B4-BE49-F238E27FC236}">
-                <a16:creationId xmlns:a16="http://schemas.microsoft.com/office/drawing/2014/main" id="{02A2C2E2-DC53-404A-A364-098CA167D6CA}"/>
+                <a16:creationId xmlns="" xmlns:a16="http://schemas.microsoft.com/office/drawing/2014/main" id="{02A2C2E2-DC53-404A-A364-098CA167D6CA}"/>
               </a:ext>
             </a:extLst>
           </p:cNvPr>
@@ -1990,7 +1990,7 @@
           <p:cNvPr id="5" name="슬라이드 번호 개체 틀 4">
             <a:extLst>
               <a:ext uri="{FF2B5EF4-FFF2-40B4-BE49-F238E27FC236}">
-                <a16:creationId xmlns:a16="http://schemas.microsoft.com/office/drawing/2014/main" id="{A746A947-32E4-412F-B828-982C043CDE20}"/>
+                <a16:creationId xmlns="" xmlns:a16="http://schemas.microsoft.com/office/drawing/2014/main" id="{A746A947-32E4-412F-B828-982C043CDE20}"/>
               </a:ext>
             </a:extLst>
           </p:cNvPr>
@@ -2049,7 +2049,7 @@
           <p:cNvPr id="2" name="날짜 개체 틀 1">
             <a:extLst>
               <a:ext uri="{FF2B5EF4-FFF2-40B4-BE49-F238E27FC236}">
-                <a16:creationId xmlns:a16="http://schemas.microsoft.com/office/drawing/2014/main" id="{0CEE6C12-6E12-4358-B313-BE30E04DB629}"/>
+                <a16:creationId xmlns="" xmlns:a16="http://schemas.microsoft.com/office/drawing/2014/main" id="{0CEE6C12-6E12-4358-B313-BE30E04DB629}"/>
               </a:ext>
             </a:extLst>
           </p:cNvPr>
@@ -2067,7 +2067,7 @@
           <a:p>
             <a:fld id="{AA6C62C0-D1AE-4FAF-BD5C-5F55576AE54B}" type="datetimeFigureOut">
               <a:rPr lang="ko-KR" altLang="en-US" smtClean="0"/>
-              <a:t>2020-03-24</a:t>
+              <a:t>2020-04-16</a:t>
             </a:fld>
             <a:endParaRPr lang="ko-KR" altLang="en-US"/>
           </a:p>
@@ -2078,7 +2078,7 @@
           <p:cNvPr id="3" name="바닥글 개체 틀 2">
             <a:extLst>
               <a:ext uri="{FF2B5EF4-FFF2-40B4-BE49-F238E27FC236}">
-                <a16:creationId xmlns:a16="http://schemas.microsoft.com/office/drawing/2014/main" id="{9CA4DD82-9569-498A-BD3A-3D7F69591786}"/>
+                <a16:creationId xmlns="" xmlns:a16="http://schemas.microsoft.com/office/drawing/2014/main" id="{9CA4DD82-9569-498A-BD3A-3D7F69591786}"/>
               </a:ext>
             </a:extLst>
           </p:cNvPr>
@@ -2103,7 +2103,7 @@
           <p:cNvPr id="4" name="슬라이드 번호 개체 틀 3">
             <a:extLst>
               <a:ext uri="{FF2B5EF4-FFF2-40B4-BE49-F238E27FC236}">
-                <a16:creationId xmlns:a16="http://schemas.microsoft.com/office/drawing/2014/main" id="{48EBD6D5-2568-49FA-9C8B-75902D245642}"/>
+                <a16:creationId xmlns="" xmlns:a16="http://schemas.microsoft.com/office/drawing/2014/main" id="{48EBD6D5-2568-49FA-9C8B-75902D245642}"/>
               </a:ext>
             </a:extLst>
           </p:cNvPr>
@@ -2162,7 +2162,7 @@
           <p:cNvPr id="2" name="제목 1">
             <a:extLst>
               <a:ext uri="{FF2B5EF4-FFF2-40B4-BE49-F238E27FC236}">
-                <a16:creationId xmlns:a16="http://schemas.microsoft.com/office/drawing/2014/main" id="{2EB11D13-54E7-4CC5-B59C-AE1C46F2F15A}"/>
+                <a16:creationId xmlns="" xmlns:a16="http://schemas.microsoft.com/office/drawing/2014/main" id="{2EB11D13-54E7-4CC5-B59C-AE1C46F2F15A}"/>
               </a:ext>
             </a:extLst>
           </p:cNvPr>
@@ -2199,7 +2199,7 @@
           <p:cNvPr id="3" name="내용 개체 틀 2">
             <a:extLst>
               <a:ext uri="{FF2B5EF4-FFF2-40B4-BE49-F238E27FC236}">
-                <a16:creationId xmlns:a16="http://schemas.microsoft.com/office/drawing/2014/main" id="{23893559-47D1-435B-A30F-394D6E19BBB4}"/>
+                <a16:creationId xmlns="" xmlns:a16="http://schemas.microsoft.com/office/drawing/2014/main" id="{23893559-47D1-435B-A30F-394D6E19BBB4}"/>
               </a:ext>
             </a:extLst>
           </p:cNvPr>
@@ -2289,7 +2289,7 @@
           <p:cNvPr id="4" name="텍스트 개체 틀 3">
             <a:extLst>
               <a:ext uri="{FF2B5EF4-FFF2-40B4-BE49-F238E27FC236}">
-                <a16:creationId xmlns:a16="http://schemas.microsoft.com/office/drawing/2014/main" id="{8FB35E55-D882-4302-ABF0-99EC767F6472}"/>
+                <a16:creationId xmlns="" xmlns:a16="http://schemas.microsoft.com/office/drawing/2014/main" id="{8FB35E55-D882-4302-ABF0-99EC767F6472}"/>
               </a:ext>
             </a:extLst>
           </p:cNvPr>
@@ -2360,7 +2360,7 @@
           <p:cNvPr id="5" name="날짜 개체 틀 4">
             <a:extLst>
               <a:ext uri="{FF2B5EF4-FFF2-40B4-BE49-F238E27FC236}">
-                <a16:creationId xmlns:a16="http://schemas.microsoft.com/office/drawing/2014/main" id="{F47EFB37-89C3-48C4-B760-353C76FBB36C}"/>
+                <a16:creationId xmlns="" xmlns:a16="http://schemas.microsoft.com/office/drawing/2014/main" id="{F47EFB37-89C3-48C4-B760-353C76FBB36C}"/>
               </a:ext>
             </a:extLst>
           </p:cNvPr>
@@ -2378,7 +2378,7 @@
           <a:p>
             <a:fld id="{AA6C62C0-D1AE-4FAF-BD5C-5F55576AE54B}" type="datetimeFigureOut">
               <a:rPr lang="ko-KR" altLang="en-US" smtClean="0"/>
-              <a:t>2020-03-24</a:t>
+              <a:t>2020-04-16</a:t>
             </a:fld>
             <a:endParaRPr lang="ko-KR" altLang="en-US"/>
           </a:p>
@@ -2389,7 +2389,7 @@
           <p:cNvPr id="6" name="바닥글 개체 틀 5">
             <a:extLst>
               <a:ext uri="{FF2B5EF4-FFF2-40B4-BE49-F238E27FC236}">
-                <a16:creationId xmlns:a16="http://schemas.microsoft.com/office/drawing/2014/main" id="{37BFE9AF-D759-42F5-95AB-9274BE0F9D93}"/>
+                <a16:creationId xmlns="" xmlns:a16="http://schemas.microsoft.com/office/drawing/2014/main" id="{37BFE9AF-D759-42F5-95AB-9274BE0F9D93}"/>
               </a:ext>
             </a:extLst>
           </p:cNvPr>
@@ -2414,7 +2414,7 @@
           <p:cNvPr id="7" name="슬라이드 번호 개체 틀 6">
             <a:extLst>
               <a:ext uri="{FF2B5EF4-FFF2-40B4-BE49-F238E27FC236}">
-                <a16:creationId xmlns:a16="http://schemas.microsoft.com/office/drawing/2014/main" id="{DF868593-FE28-4236-8344-45B6DCD017AE}"/>
+                <a16:creationId xmlns="" xmlns:a16="http://schemas.microsoft.com/office/drawing/2014/main" id="{DF868593-FE28-4236-8344-45B6DCD017AE}"/>
               </a:ext>
             </a:extLst>
           </p:cNvPr>
@@ -2473,7 +2473,7 @@
           <p:cNvPr id="2" name="제목 1">
             <a:extLst>
               <a:ext uri="{FF2B5EF4-FFF2-40B4-BE49-F238E27FC236}">
-                <a16:creationId xmlns:a16="http://schemas.microsoft.com/office/drawing/2014/main" id="{450806E2-B23A-46E0-91FE-B1634303A055}"/>
+                <a16:creationId xmlns="" xmlns:a16="http://schemas.microsoft.com/office/drawing/2014/main" id="{450806E2-B23A-46E0-91FE-B1634303A055}"/>
               </a:ext>
             </a:extLst>
           </p:cNvPr>
@@ -2510,7 +2510,7 @@
           <p:cNvPr id="3" name="그림 개체 틀 2">
             <a:extLst>
               <a:ext uri="{FF2B5EF4-FFF2-40B4-BE49-F238E27FC236}">
-                <a16:creationId xmlns:a16="http://schemas.microsoft.com/office/drawing/2014/main" id="{9B987B42-94B4-49C5-907E-567150211477}"/>
+                <a16:creationId xmlns="" xmlns:a16="http://schemas.microsoft.com/office/drawing/2014/main" id="{9B987B42-94B4-49C5-907E-567150211477}"/>
               </a:ext>
             </a:extLst>
           </p:cNvPr>
@@ -2577,7 +2577,7 @@
           <p:cNvPr id="4" name="텍스트 개체 틀 3">
             <a:extLst>
               <a:ext uri="{FF2B5EF4-FFF2-40B4-BE49-F238E27FC236}">
-                <a16:creationId xmlns:a16="http://schemas.microsoft.com/office/drawing/2014/main" id="{EADE1669-0091-4654-BD39-2C7FC937C2BE}"/>
+                <a16:creationId xmlns="" xmlns:a16="http://schemas.microsoft.com/office/drawing/2014/main" id="{EADE1669-0091-4654-BD39-2C7FC937C2BE}"/>
               </a:ext>
             </a:extLst>
           </p:cNvPr>
@@ -2648,7 +2648,7 @@
           <p:cNvPr id="5" name="날짜 개체 틀 4">
             <a:extLst>
               <a:ext uri="{FF2B5EF4-FFF2-40B4-BE49-F238E27FC236}">
-                <a16:creationId xmlns:a16="http://schemas.microsoft.com/office/drawing/2014/main" id="{D64ECC2C-67AB-4965-AAFA-D0386E01FBE2}"/>
+                <a16:creationId xmlns="" xmlns:a16="http://schemas.microsoft.com/office/drawing/2014/main" id="{D64ECC2C-67AB-4965-AAFA-D0386E01FBE2}"/>
               </a:ext>
             </a:extLst>
           </p:cNvPr>
@@ -2666,7 +2666,7 @@
           <a:p>
             <a:fld id="{AA6C62C0-D1AE-4FAF-BD5C-5F55576AE54B}" type="datetimeFigureOut">
               <a:rPr lang="ko-KR" altLang="en-US" smtClean="0"/>
-              <a:t>2020-03-24</a:t>
+              <a:t>2020-04-16</a:t>
             </a:fld>
             <a:endParaRPr lang="ko-KR" altLang="en-US"/>
           </a:p>
@@ -2677,7 +2677,7 @@
           <p:cNvPr id="6" name="바닥글 개체 틀 5">
             <a:extLst>
               <a:ext uri="{FF2B5EF4-FFF2-40B4-BE49-F238E27FC236}">
-                <a16:creationId xmlns:a16="http://schemas.microsoft.com/office/drawing/2014/main" id="{524C4F8B-0DB5-4A05-80D3-E7DBB96718CC}"/>
+                <a16:creationId xmlns="" xmlns:a16="http://schemas.microsoft.com/office/drawing/2014/main" id="{524C4F8B-0DB5-4A05-80D3-E7DBB96718CC}"/>
               </a:ext>
             </a:extLst>
           </p:cNvPr>
@@ -2702,7 +2702,7 @@
           <p:cNvPr id="7" name="슬라이드 번호 개체 틀 6">
             <a:extLst>
               <a:ext uri="{FF2B5EF4-FFF2-40B4-BE49-F238E27FC236}">
-                <a16:creationId xmlns:a16="http://schemas.microsoft.com/office/drawing/2014/main" id="{0778C95F-C340-4CED-89A7-78B2C59A7F59}"/>
+                <a16:creationId xmlns="" xmlns:a16="http://schemas.microsoft.com/office/drawing/2014/main" id="{0778C95F-C340-4CED-89A7-78B2C59A7F59}"/>
               </a:ext>
             </a:extLst>
           </p:cNvPr>
@@ -2766,7 +2766,7 @@
           <p:cNvPr id="2" name="제목 개체 틀 1">
             <a:extLst>
               <a:ext uri="{FF2B5EF4-FFF2-40B4-BE49-F238E27FC236}">
-                <a16:creationId xmlns:a16="http://schemas.microsoft.com/office/drawing/2014/main" id="{FE4AC15B-D036-4AAF-A2CB-F872998CB557}"/>
+                <a16:creationId xmlns="" xmlns:a16="http://schemas.microsoft.com/office/drawing/2014/main" id="{FE4AC15B-D036-4AAF-A2CB-F872998CB557}"/>
               </a:ext>
             </a:extLst>
           </p:cNvPr>
@@ -2804,7 +2804,7 @@
           <p:cNvPr id="3" name="텍스트 개체 틀 2">
             <a:extLst>
               <a:ext uri="{FF2B5EF4-FFF2-40B4-BE49-F238E27FC236}">
-                <a16:creationId xmlns:a16="http://schemas.microsoft.com/office/drawing/2014/main" id="{BDED4FC2-421B-4025-8782-9325B0508DF5}"/>
+                <a16:creationId xmlns="" xmlns:a16="http://schemas.microsoft.com/office/drawing/2014/main" id="{BDED4FC2-421B-4025-8782-9325B0508DF5}"/>
               </a:ext>
             </a:extLst>
           </p:cNvPr>
@@ -2871,7 +2871,7 @@
           <p:cNvPr id="4" name="날짜 개체 틀 3">
             <a:extLst>
               <a:ext uri="{FF2B5EF4-FFF2-40B4-BE49-F238E27FC236}">
-                <a16:creationId xmlns:a16="http://schemas.microsoft.com/office/drawing/2014/main" id="{78D2E355-65F1-4927-8E63-76D9CE1A292B}"/>
+                <a16:creationId xmlns="" xmlns:a16="http://schemas.microsoft.com/office/drawing/2014/main" id="{78D2E355-65F1-4927-8E63-76D9CE1A292B}"/>
               </a:ext>
             </a:extLst>
           </p:cNvPr>
@@ -2907,7 +2907,7 @@
           <a:p>
             <a:fld id="{AA6C62C0-D1AE-4FAF-BD5C-5F55576AE54B}" type="datetimeFigureOut">
               <a:rPr lang="ko-KR" altLang="en-US" smtClean="0"/>
-              <a:t>2020-03-24</a:t>
+              <a:t>2020-04-16</a:t>
             </a:fld>
             <a:endParaRPr lang="ko-KR" altLang="en-US"/>
           </a:p>
@@ -2918,7 +2918,7 @@
           <p:cNvPr id="5" name="바닥글 개체 틀 4">
             <a:extLst>
               <a:ext uri="{FF2B5EF4-FFF2-40B4-BE49-F238E27FC236}">
-                <a16:creationId xmlns:a16="http://schemas.microsoft.com/office/drawing/2014/main" id="{691C4364-54E7-488D-ABC6-B04148BE54FE}"/>
+                <a16:creationId xmlns="" xmlns:a16="http://schemas.microsoft.com/office/drawing/2014/main" id="{691C4364-54E7-488D-ABC6-B04148BE54FE}"/>
               </a:ext>
             </a:extLst>
           </p:cNvPr>
@@ -2961,7 +2961,7 @@
           <p:cNvPr id="6" name="슬라이드 번호 개체 틀 5">
             <a:extLst>
               <a:ext uri="{FF2B5EF4-FFF2-40B4-BE49-F238E27FC236}">
-                <a16:creationId xmlns:a16="http://schemas.microsoft.com/office/drawing/2014/main" id="{F26DBAB3-AA8E-4D2C-B981-D23A458FC581}"/>
+                <a16:creationId xmlns="" xmlns:a16="http://schemas.microsoft.com/office/drawing/2014/main" id="{F26DBAB3-AA8E-4D2C-B981-D23A458FC581}"/>
               </a:ext>
             </a:extLst>
           </p:cNvPr>
@@ -3329,7 +3329,7 @@
           <p:cNvPr id="11" name="그림 10" descr="스크린샷이(가) 표시된 사진&#10;&#10;자동 생성된 설명">
             <a:extLst>
               <a:ext uri="{FF2B5EF4-FFF2-40B4-BE49-F238E27FC236}">
-                <a16:creationId xmlns:a16="http://schemas.microsoft.com/office/drawing/2014/main" id="{55D036CF-A275-4794-BFC3-EB5FC8DB9915}"/>
+                <a16:creationId xmlns="" xmlns:a16="http://schemas.microsoft.com/office/drawing/2014/main" id="{55D036CF-A275-4794-BFC3-EB5FC8DB9915}"/>
               </a:ext>
             </a:extLst>
           </p:cNvPr>
@@ -3339,7 +3339,7 @@
           <p:nvPr/>
         </p:nvPicPr>
         <p:blipFill>
-          <a:blip r:embed="rId2">
+          <a:blip r:embed="rId2" cstate="print">
             <a:extLst>
               <a:ext uri="{28A0092B-C50C-407E-A947-70E740481C1C}">
                 <a14:useLocalDpi xmlns:a14="http://schemas.microsoft.com/office/drawing/2010/main" val="0"/>
@@ -3365,7 +3365,7 @@
           <p:cNvPr id="15" name="그림 14">
             <a:extLst>
               <a:ext uri="{FF2B5EF4-FFF2-40B4-BE49-F238E27FC236}">
-                <a16:creationId xmlns:a16="http://schemas.microsoft.com/office/drawing/2014/main" id="{D08C794E-276F-4DFF-A296-5C6B70020B0B}"/>
+                <a16:creationId xmlns="" xmlns:a16="http://schemas.microsoft.com/office/drawing/2014/main" id="{D08C794E-276F-4DFF-A296-5C6B70020B0B}"/>
               </a:ext>
             </a:extLst>
           </p:cNvPr>
@@ -3375,7 +3375,7 @@
           <p:nvPr/>
         </p:nvPicPr>
         <p:blipFill>
-          <a:blip r:embed="rId3">
+          <a:blip r:embed="rId3" cstate="print">
             <a:extLst>
               <a:ext uri="{28A0092B-C50C-407E-A947-70E740481C1C}">
                 <a14:useLocalDpi xmlns:a14="http://schemas.microsoft.com/office/drawing/2010/main" val="0"/>
@@ -3401,7 +3401,7 @@
           <p:cNvPr id="18" name="연결선: 꺾임 17">
             <a:extLst>
               <a:ext uri="{FF2B5EF4-FFF2-40B4-BE49-F238E27FC236}">
-                <a16:creationId xmlns:a16="http://schemas.microsoft.com/office/drawing/2014/main" id="{8ED4286E-7A9F-467D-BBC4-44437406E178}"/>
+                <a16:creationId xmlns="" xmlns:a16="http://schemas.microsoft.com/office/drawing/2014/main" id="{8ED4286E-7A9F-467D-BBC4-44437406E178}"/>
               </a:ext>
             </a:extLst>
           </p:cNvPr>
@@ -3451,7 +3451,7 @@
           <p:cNvPr id="20" name="연결선: 꺾임 19">
             <a:extLst>
               <a:ext uri="{FF2B5EF4-FFF2-40B4-BE49-F238E27FC236}">
-                <a16:creationId xmlns:a16="http://schemas.microsoft.com/office/drawing/2014/main" id="{156FCA16-F4F7-4A71-85D3-3E824172AD13}"/>
+                <a16:creationId xmlns="" xmlns:a16="http://schemas.microsoft.com/office/drawing/2014/main" id="{156FCA16-F4F7-4A71-85D3-3E824172AD13}"/>
               </a:ext>
             </a:extLst>
           </p:cNvPr>
@@ -3499,7 +3499,7 @@
           <p:cNvPr id="30" name="그림 29" descr="스크린샷이(가) 표시된 사진&#10;&#10;자동 생성된 설명">
             <a:extLst>
               <a:ext uri="{FF2B5EF4-FFF2-40B4-BE49-F238E27FC236}">
-                <a16:creationId xmlns:a16="http://schemas.microsoft.com/office/drawing/2014/main" id="{06C4148D-73BC-4BB0-8446-B7C0F3AE72FF}"/>
+                <a16:creationId xmlns="" xmlns:a16="http://schemas.microsoft.com/office/drawing/2014/main" id="{06C4148D-73BC-4BB0-8446-B7C0F3AE72FF}"/>
               </a:ext>
             </a:extLst>
           </p:cNvPr>
@@ -3509,7 +3509,7 @@
           <p:nvPr/>
         </p:nvPicPr>
         <p:blipFill>
-          <a:blip r:embed="rId4">
+          <a:blip r:embed="rId4" cstate="print">
             <a:extLst>
               <a:ext uri="{28A0092B-C50C-407E-A947-70E740481C1C}">
                 <a14:useLocalDpi xmlns:a14="http://schemas.microsoft.com/office/drawing/2010/main" val="0"/>
@@ -3535,7 +3535,7 @@
           <p:cNvPr id="71" name="타원 70">
             <a:extLst>
               <a:ext uri="{FF2B5EF4-FFF2-40B4-BE49-F238E27FC236}">
-                <a16:creationId xmlns:a16="http://schemas.microsoft.com/office/drawing/2014/main" id="{0820AC2B-73A2-4C0C-B5AB-3DDBABF58262}"/>
+                <a16:creationId xmlns="" xmlns:a16="http://schemas.microsoft.com/office/drawing/2014/main" id="{0820AC2B-73A2-4C0C-B5AB-3DDBABF58262}"/>
               </a:ext>
             </a:extLst>
           </p:cNvPr>
@@ -3589,7 +3589,7 @@
           <p:cNvPr id="76" name="타원 75">
             <a:extLst>
               <a:ext uri="{FF2B5EF4-FFF2-40B4-BE49-F238E27FC236}">
-                <a16:creationId xmlns:a16="http://schemas.microsoft.com/office/drawing/2014/main" id="{E2A535F7-ACBD-4237-B1F8-58570004DD8A}"/>
+                <a16:creationId xmlns="" xmlns:a16="http://schemas.microsoft.com/office/drawing/2014/main" id="{E2A535F7-ACBD-4237-B1F8-58570004DD8A}"/>
               </a:ext>
             </a:extLst>
           </p:cNvPr>
@@ -3643,7 +3643,7 @@
           <p:cNvPr id="77" name="타원 76">
             <a:extLst>
               <a:ext uri="{FF2B5EF4-FFF2-40B4-BE49-F238E27FC236}">
-                <a16:creationId xmlns:a16="http://schemas.microsoft.com/office/drawing/2014/main" id="{8BA28225-8C39-4D47-8743-C1071AFA849F}"/>
+                <a16:creationId xmlns="" xmlns:a16="http://schemas.microsoft.com/office/drawing/2014/main" id="{8BA28225-8C39-4D47-8743-C1071AFA849F}"/>
               </a:ext>
             </a:extLst>
           </p:cNvPr>
@@ -3697,7 +3697,7 @@
           <p:cNvPr id="80" name="TextBox 79">
             <a:extLst>
               <a:ext uri="{FF2B5EF4-FFF2-40B4-BE49-F238E27FC236}">
-                <a16:creationId xmlns:a16="http://schemas.microsoft.com/office/drawing/2014/main" id="{0FB5F376-51C0-4E24-9693-24B40203403F}"/>
+                <a16:creationId xmlns="" xmlns:a16="http://schemas.microsoft.com/office/drawing/2014/main" id="{0FB5F376-51C0-4E24-9693-24B40203403F}"/>
               </a:ext>
             </a:extLst>
           </p:cNvPr>
@@ -3741,7 +3741,7 @@
           <p:cNvPr id="94" name="그림 93" descr="스크린샷이(가) 표시된 사진&#10;&#10;자동 생성된 설명">
             <a:extLst>
               <a:ext uri="{FF2B5EF4-FFF2-40B4-BE49-F238E27FC236}">
-                <a16:creationId xmlns:a16="http://schemas.microsoft.com/office/drawing/2014/main" id="{5391AACF-E8FE-4FBC-925A-877CD330B09E}"/>
+                <a16:creationId xmlns="" xmlns:a16="http://schemas.microsoft.com/office/drawing/2014/main" id="{5391AACF-E8FE-4FBC-925A-877CD330B09E}"/>
               </a:ext>
             </a:extLst>
           </p:cNvPr>
@@ -3751,7 +3751,7 @@
           <p:nvPr/>
         </p:nvPicPr>
         <p:blipFill>
-          <a:blip r:embed="rId5">
+          <a:blip r:embed="rId5" cstate="print">
             <a:extLst>
               <a:ext uri="{28A0092B-C50C-407E-A947-70E740481C1C}">
                 <a14:useLocalDpi xmlns:a14="http://schemas.microsoft.com/office/drawing/2010/main" val="0"/>
@@ -3777,7 +3777,7 @@
           <p:cNvPr id="100" name="타원 99">
             <a:extLst>
               <a:ext uri="{FF2B5EF4-FFF2-40B4-BE49-F238E27FC236}">
-                <a16:creationId xmlns:a16="http://schemas.microsoft.com/office/drawing/2014/main" id="{B5CB81AD-A071-44B1-A00B-1A2BD1D9E54B}"/>
+                <a16:creationId xmlns="" xmlns:a16="http://schemas.microsoft.com/office/drawing/2014/main" id="{B5CB81AD-A071-44B1-A00B-1A2BD1D9E54B}"/>
               </a:ext>
             </a:extLst>
           </p:cNvPr>
@@ -3831,7 +3831,7 @@
           <p:cNvPr id="101" name="연결선: 꺾임 100">
             <a:extLst>
               <a:ext uri="{FF2B5EF4-FFF2-40B4-BE49-F238E27FC236}">
-                <a16:creationId xmlns:a16="http://schemas.microsoft.com/office/drawing/2014/main" id="{6EA34379-8589-4C7B-8FE7-5BE3DDD52568}"/>
+                <a16:creationId xmlns="" xmlns:a16="http://schemas.microsoft.com/office/drawing/2014/main" id="{6EA34379-8589-4C7B-8FE7-5BE3DDD52568}"/>
               </a:ext>
             </a:extLst>
           </p:cNvPr>
@@ -3881,7 +3881,7 @@
           <p:cNvPr id="111" name="타원 110">
             <a:extLst>
               <a:ext uri="{FF2B5EF4-FFF2-40B4-BE49-F238E27FC236}">
-                <a16:creationId xmlns:a16="http://schemas.microsoft.com/office/drawing/2014/main" id="{D7C7B73D-32E8-41A9-95E1-E69BDC247517}"/>
+                <a16:creationId xmlns="" xmlns:a16="http://schemas.microsoft.com/office/drawing/2014/main" id="{D7C7B73D-32E8-41A9-95E1-E69BDC247517}"/>
               </a:ext>
             </a:extLst>
           </p:cNvPr>
@@ -3935,7 +3935,7 @@
           <p:cNvPr id="34" name="연결선: 꺾임 33">
             <a:extLst>
               <a:ext uri="{FF2B5EF4-FFF2-40B4-BE49-F238E27FC236}">
-                <a16:creationId xmlns:a16="http://schemas.microsoft.com/office/drawing/2014/main" id="{340713E8-0C35-4D18-A050-8A357BFD70CE}"/>
+                <a16:creationId xmlns="" xmlns:a16="http://schemas.microsoft.com/office/drawing/2014/main" id="{340713E8-0C35-4D18-A050-8A357BFD70CE}"/>
               </a:ext>
             </a:extLst>
           </p:cNvPr>
@@ -3986,7 +3986,7 @@
           <p:cNvPr id="132" name="타원 131">
             <a:extLst>
               <a:ext uri="{FF2B5EF4-FFF2-40B4-BE49-F238E27FC236}">
-                <a16:creationId xmlns:a16="http://schemas.microsoft.com/office/drawing/2014/main" id="{6E458961-674C-472B-B0A0-FF1D6B16832C}"/>
+                <a16:creationId xmlns="" xmlns:a16="http://schemas.microsoft.com/office/drawing/2014/main" id="{6E458961-674C-472B-B0A0-FF1D6B16832C}"/>
               </a:ext>
             </a:extLst>
           </p:cNvPr>
@@ -4040,7 +4040,7 @@
           <p:cNvPr id="133" name="연결선: 꺾임 132">
             <a:extLst>
               <a:ext uri="{FF2B5EF4-FFF2-40B4-BE49-F238E27FC236}">
-                <a16:creationId xmlns:a16="http://schemas.microsoft.com/office/drawing/2014/main" id="{2EE9A7E0-E93A-4BC6-8C57-52FAAE4A4AB7}"/>
+                <a16:creationId xmlns="" xmlns:a16="http://schemas.microsoft.com/office/drawing/2014/main" id="{2EE9A7E0-E93A-4BC6-8C57-52FAAE4A4AB7}"/>
               </a:ext>
             </a:extLst>
           </p:cNvPr>
@@ -4121,7 +4121,7 @@
           <p:cNvPr id="11" name="그림 10" descr="스크린샷이(가) 표시된 사진&#10;&#10;자동 생성된 설명">
             <a:extLst>
               <a:ext uri="{FF2B5EF4-FFF2-40B4-BE49-F238E27FC236}">
-                <a16:creationId xmlns:a16="http://schemas.microsoft.com/office/drawing/2014/main" id="{55D036CF-A275-4794-BFC3-EB5FC8DB9915}"/>
+                <a16:creationId xmlns="" xmlns:a16="http://schemas.microsoft.com/office/drawing/2014/main" id="{55D036CF-A275-4794-BFC3-EB5FC8DB9915}"/>
               </a:ext>
             </a:extLst>
           </p:cNvPr>
@@ -4131,7 +4131,7 @@
           <p:nvPr/>
         </p:nvPicPr>
         <p:blipFill>
-          <a:blip r:embed="rId2">
+          <a:blip r:embed="rId2" cstate="print">
             <a:extLst>
               <a:ext uri="{28A0092B-C50C-407E-A947-70E740481C1C}">
                 <a14:useLocalDpi xmlns:a14="http://schemas.microsoft.com/office/drawing/2010/main" val="0"/>
@@ -4157,7 +4157,7 @@
           <p:cNvPr id="18" name="연결선: 꺾임 17">
             <a:extLst>
               <a:ext uri="{FF2B5EF4-FFF2-40B4-BE49-F238E27FC236}">
-                <a16:creationId xmlns:a16="http://schemas.microsoft.com/office/drawing/2014/main" id="{8ED4286E-7A9F-467D-BBC4-44437406E178}"/>
+                <a16:creationId xmlns="" xmlns:a16="http://schemas.microsoft.com/office/drawing/2014/main" id="{8ED4286E-7A9F-467D-BBC4-44437406E178}"/>
               </a:ext>
             </a:extLst>
           </p:cNvPr>
@@ -4207,7 +4207,7 @@
           <p:cNvPr id="22" name="그림 21" descr="스크린샷이(가) 표시된 사진&#10;&#10;자동 생성된 설명">
             <a:extLst>
               <a:ext uri="{FF2B5EF4-FFF2-40B4-BE49-F238E27FC236}">
-                <a16:creationId xmlns:a16="http://schemas.microsoft.com/office/drawing/2014/main" id="{6A78550A-B646-46AD-BF09-1D8AED4D3C21}"/>
+                <a16:creationId xmlns="" xmlns:a16="http://schemas.microsoft.com/office/drawing/2014/main" id="{6A78550A-B646-46AD-BF09-1D8AED4D3C21}"/>
               </a:ext>
             </a:extLst>
           </p:cNvPr>
@@ -4217,7 +4217,7 @@
           <p:nvPr/>
         </p:nvPicPr>
         <p:blipFill>
-          <a:blip r:embed="rId3">
+          <a:blip r:embed="rId3" cstate="print">
             <a:extLst>
               <a:ext uri="{28A0092B-C50C-407E-A947-70E740481C1C}">
                 <a14:useLocalDpi xmlns:a14="http://schemas.microsoft.com/office/drawing/2010/main" val="0"/>
@@ -4243,7 +4243,7 @@
           <p:cNvPr id="26" name="연결선: 꺾임 25">
             <a:extLst>
               <a:ext uri="{FF2B5EF4-FFF2-40B4-BE49-F238E27FC236}">
-                <a16:creationId xmlns:a16="http://schemas.microsoft.com/office/drawing/2014/main" id="{29EEA6FB-CF26-42F5-AAD2-CF1569F15474}"/>
+                <a16:creationId xmlns="" xmlns:a16="http://schemas.microsoft.com/office/drawing/2014/main" id="{29EEA6FB-CF26-42F5-AAD2-CF1569F15474}"/>
               </a:ext>
             </a:extLst>
           </p:cNvPr>
@@ -4268,7 +4268,7 @@
           </a:prstGeom>
           <a:ln w="15875">
             <a:solidFill>
-              <a:schemeClr val="accent4">
+              <a:schemeClr val="accent2">
                 <a:alpha val="75000"/>
               </a:schemeClr>
             </a:solidFill>
@@ -4295,7 +4295,7 @@
           <p:cNvPr id="28" name="그림 27" descr="스크린샷이(가) 표시된 사진&#10;&#10;자동 생성된 설명">
             <a:extLst>
               <a:ext uri="{FF2B5EF4-FFF2-40B4-BE49-F238E27FC236}">
-                <a16:creationId xmlns:a16="http://schemas.microsoft.com/office/drawing/2014/main" id="{CEF36C87-AE80-43FA-AB3B-639FF00CDA0D}"/>
+                <a16:creationId xmlns="" xmlns:a16="http://schemas.microsoft.com/office/drawing/2014/main" id="{CEF36C87-AE80-43FA-AB3B-639FF00CDA0D}"/>
               </a:ext>
             </a:extLst>
           </p:cNvPr>
@@ -4305,7 +4305,7 @@
           <p:nvPr/>
         </p:nvPicPr>
         <p:blipFill>
-          <a:blip r:embed="rId4">
+          <a:blip r:embed="rId4" cstate="print">
             <a:extLst>
               <a:ext uri="{28A0092B-C50C-407E-A947-70E740481C1C}">
                 <a14:useLocalDpi xmlns:a14="http://schemas.microsoft.com/office/drawing/2010/main" val="0"/>
@@ -4331,7 +4331,7 @@
           <p:cNvPr id="30" name="그림 29" descr="스크린샷이(가) 표시된 사진&#10;&#10;자동 생성된 설명">
             <a:extLst>
               <a:ext uri="{FF2B5EF4-FFF2-40B4-BE49-F238E27FC236}">
-                <a16:creationId xmlns:a16="http://schemas.microsoft.com/office/drawing/2014/main" id="{06C4148D-73BC-4BB0-8446-B7C0F3AE72FF}"/>
+                <a16:creationId xmlns="" xmlns:a16="http://schemas.microsoft.com/office/drawing/2014/main" id="{06C4148D-73BC-4BB0-8446-B7C0F3AE72FF}"/>
               </a:ext>
             </a:extLst>
           </p:cNvPr>
@@ -4341,7 +4341,7 @@
           <p:nvPr/>
         </p:nvPicPr>
         <p:blipFill>
-          <a:blip r:embed="rId5">
+          <a:blip r:embed="rId5" cstate="print">
             <a:extLst>
               <a:ext uri="{28A0092B-C50C-407E-A947-70E740481C1C}">
                 <a14:useLocalDpi xmlns:a14="http://schemas.microsoft.com/office/drawing/2010/main" val="0"/>
@@ -4367,7 +4367,7 @@
           <p:cNvPr id="34" name="연결선: 꺾임 33">
             <a:extLst>
               <a:ext uri="{FF2B5EF4-FFF2-40B4-BE49-F238E27FC236}">
-                <a16:creationId xmlns:a16="http://schemas.microsoft.com/office/drawing/2014/main" id="{340713E8-0C35-4D18-A050-8A357BFD70CE}"/>
+                <a16:creationId xmlns="" xmlns:a16="http://schemas.microsoft.com/office/drawing/2014/main" id="{340713E8-0C35-4D18-A050-8A357BFD70CE}"/>
               </a:ext>
             </a:extLst>
           </p:cNvPr>
@@ -4417,7 +4417,7 @@
           <p:cNvPr id="50" name="그림 49">
             <a:extLst>
               <a:ext uri="{FF2B5EF4-FFF2-40B4-BE49-F238E27FC236}">
-                <a16:creationId xmlns:a16="http://schemas.microsoft.com/office/drawing/2014/main" id="{CF2DDBAA-C90C-4F16-972E-DB6175ABA973}"/>
+                <a16:creationId xmlns="" xmlns:a16="http://schemas.microsoft.com/office/drawing/2014/main" id="{CF2DDBAA-C90C-4F16-972E-DB6175ABA973}"/>
               </a:ext>
             </a:extLst>
           </p:cNvPr>
@@ -4427,7 +4427,7 @@
           <p:nvPr/>
         </p:nvPicPr>
         <p:blipFill>
-          <a:blip r:embed="rId6">
+          <a:blip r:embed="rId6" cstate="print">
             <a:extLst>
               <a:ext uri="{28A0092B-C50C-407E-A947-70E740481C1C}">
                 <a14:useLocalDpi xmlns:a14="http://schemas.microsoft.com/office/drawing/2010/main" val="0"/>
@@ -4441,7 +4441,7 @@
         <p:spPr>
           <a:xfrm>
             <a:off x="7511276" y="188241"/>
-            <a:ext cx="1804079" cy="3006798"/>
+            <a:ext cx="1804078" cy="3006798"/>
           </a:xfrm>
           <a:prstGeom prst="rect">
             <a:avLst/>
@@ -4453,7 +4453,7 @@
           <p:cNvPr id="54" name="연결선: 꺾임 53">
             <a:extLst>
               <a:ext uri="{FF2B5EF4-FFF2-40B4-BE49-F238E27FC236}">
-                <a16:creationId xmlns:a16="http://schemas.microsoft.com/office/drawing/2014/main" id="{7489A872-4772-41F2-8138-CE1EB60B72FC}"/>
+                <a16:creationId xmlns="" xmlns:a16="http://schemas.microsoft.com/office/drawing/2014/main" id="{7489A872-4772-41F2-8138-CE1EB60B72FC}"/>
               </a:ext>
             </a:extLst>
           </p:cNvPr>
@@ -4503,7 +4503,7 @@
           <p:cNvPr id="58" name="직선 화살표 연결선 57">
             <a:extLst>
               <a:ext uri="{FF2B5EF4-FFF2-40B4-BE49-F238E27FC236}">
-                <a16:creationId xmlns:a16="http://schemas.microsoft.com/office/drawing/2014/main" id="{4E8D8D29-1060-4F41-B557-A44A073EC3D4}"/>
+                <a16:creationId xmlns="" xmlns:a16="http://schemas.microsoft.com/office/drawing/2014/main" id="{4E8D8D29-1060-4F41-B557-A44A073EC3D4}"/>
               </a:ext>
             </a:extLst>
           </p:cNvPr>
@@ -4553,7 +4553,7 @@
           <p:cNvPr id="63" name="타원 62">
             <a:extLst>
               <a:ext uri="{FF2B5EF4-FFF2-40B4-BE49-F238E27FC236}">
-                <a16:creationId xmlns:a16="http://schemas.microsoft.com/office/drawing/2014/main" id="{248648E2-87E5-4A9A-9695-BC7849FE3D58}"/>
+                <a16:creationId xmlns="" xmlns:a16="http://schemas.microsoft.com/office/drawing/2014/main" id="{248648E2-87E5-4A9A-9695-BC7849FE3D58}"/>
               </a:ext>
             </a:extLst>
           </p:cNvPr>
@@ -4607,7 +4607,7 @@
           <p:cNvPr id="66" name="타원 65">
             <a:extLst>
               <a:ext uri="{FF2B5EF4-FFF2-40B4-BE49-F238E27FC236}">
-                <a16:creationId xmlns:a16="http://schemas.microsoft.com/office/drawing/2014/main" id="{C5F132C3-CA06-47A2-B4DB-9660185A6399}"/>
+                <a16:creationId xmlns="" xmlns:a16="http://schemas.microsoft.com/office/drawing/2014/main" id="{C5F132C3-CA06-47A2-B4DB-9660185A6399}"/>
               </a:ext>
             </a:extLst>
           </p:cNvPr>
@@ -4661,7 +4661,7 @@
           <p:cNvPr id="71" name="타원 70">
             <a:extLst>
               <a:ext uri="{FF2B5EF4-FFF2-40B4-BE49-F238E27FC236}">
-                <a16:creationId xmlns:a16="http://schemas.microsoft.com/office/drawing/2014/main" id="{0820AC2B-73A2-4C0C-B5AB-3DDBABF58262}"/>
+                <a16:creationId xmlns="" xmlns:a16="http://schemas.microsoft.com/office/drawing/2014/main" id="{0820AC2B-73A2-4C0C-B5AB-3DDBABF58262}"/>
               </a:ext>
             </a:extLst>
           </p:cNvPr>
@@ -4715,7 +4715,7 @@
           <p:cNvPr id="76" name="타원 75">
             <a:extLst>
               <a:ext uri="{FF2B5EF4-FFF2-40B4-BE49-F238E27FC236}">
-                <a16:creationId xmlns:a16="http://schemas.microsoft.com/office/drawing/2014/main" id="{E2A535F7-ACBD-4237-B1F8-58570004DD8A}"/>
+                <a16:creationId xmlns="" xmlns:a16="http://schemas.microsoft.com/office/drawing/2014/main" id="{E2A535F7-ACBD-4237-B1F8-58570004DD8A}"/>
               </a:ext>
             </a:extLst>
           </p:cNvPr>
@@ -4769,7 +4769,7 @@
           <p:cNvPr id="78" name="타원 77">
             <a:extLst>
               <a:ext uri="{FF2B5EF4-FFF2-40B4-BE49-F238E27FC236}">
-                <a16:creationId xmlns:a16="http://schemas.microsoft.com/office/drawing/2014/main" id="{1B34615D-3CFD-4A66-AA99-67F60CF831B7}"/>
+                <a16:creationId xmlns="" xmlns:a16="http://schemas.microsoft.com/office/drawing/2014/main" id="{1B34615D-3CFD-4A66-AA99-67F60CF831B7}"/>
               </a:ext>
             </a:extLst>
           </p:cNvPr>
@@ -4787,7 +4787,7 @@
           <a:noFill/>
           <a:ln w="15875">
             <a:solidFill>
-              <a:schemeClr val="accent4">
+              <a:schemeClr val="accent2">
                 <a:alpha val="75000"/>
               </a:schemeClr>
             </a:solidFill>
@@ -4823,7 +4823,7 @@
           <p:cNvPr id="2" name="직사각형 1">
             <a:extLst>
               <a:ext uri="{FF2B5EF4-FFF2-40B4-BE49-F238E27FC236}">
-                <a16:creationId xmlns:a16="http://schemas.microsoft.com/office/drawing/2014/main" id="{FD79D6EE-8571-42D4-A4C6-5DFBE6657FCA}"/>
+                <a16:creationId xmlns="" xmlns:a16="http://schemas.microsoft.com/office/drawing/2014/main" id="{FD79D6EE-8571-42D4-A4C6-5DFBE6657FCA}"/>
               </a:ext>
             </a:extLst>
           </p:cNvPr>
@@ -4874,7 +4874,7 @@
           <p:cNvPr id="35" name="타원 34">
             <a:extLst>
               <a:ext uri="{FF2B5EF4-FFF2-40B4-BE49-F238E27FC236}">
-                <a16:creationId xmlns:a16="http://schemas.microsoft.com/office/drawing/2014/main" id="{80BDDC33-5BBB-43EE-BFC8-4FD2A08D6A8B}"/>
+                <a16:creationId xmlns="" xmlns:a16="http://schemas.microsoft.com/office/drawing/2014/main" id="{80BDDC33-5BBB-43EE-BFC8-4FD2A08D6A8B}"/>
               </a:ext>
             </a:extLst>
           </p:cNvPr>
@@ -4928,7 +4928,7 @@
           <p:cNvPr id="36" name="연결선: 꺾임 35">
             <a:extLst>
               <a:ext uri="{FF2B5EF4-FFF2-40B4-BE49-F238E27FC236}">
-                <a16:creationId xmlns:a16="http://schemas.microsoft.com/office/drawing/2014/main" id="{AD868A05-8FC6-4242-995A-F28224414B11}"/>
+                <a16:creationId xmlns="" xmlns:a16="http://schemas.microsoft.com/office/drawing/2014/main" id="{AD868A05-8FC6-4242-995A-F28224414B11}"/>
               </a:ext>
             </a:extLst>
           </p:cNvPr>
@@ -4978,7 +4978,7 @@
           <p:cNvPr id="51" name="타원 50">
             <a:extLst>
               <a:ext uri="{FF2B5EF4-FFF2-40B4-BE49-F238E27FC236}">
-                <a16:creationId xmlns:a16="http://schemas.microsoft.com/office/drawing/2014/main" id="{29A37719-3546-48E9-A598-48F7129F1A59}"/>
+                <a16:creationId xmlns="" xmlns:a16="http://schemas.microsoft.com/office/drawing/2014/main" id="{29A37719-3546-48E9-A598-48F7129F1A59}"/>
               </a:ext>
             </a:extLst>
           </p:cNvPr>
@@ -4996,7 +4996,7 @@
           <a:noFill/>
           <a:ln w="15875">
             <a:solidFill>
-              <a:schemeClr val="accent4">
+              <a:schemeClr val="accent2">
                 <a:alpha val="75000"/>
               </a:schemeClr>
             </a:solidFill>
@@ -5032,7 +5032,7 @@
           <p:cNvPr id="53" name="연결선: 꺾임 52">
             <a:extLst>
               <a:ext uri="{FF2B5EF4-FFF2-40B4-BE49-F238E27FC236}">
-                <a16:creationId xmlns:a16="http://schemas.microsoft.com/office/drawing/2014/main" id="{F418DEA7-7859-4C2C-A524-5CAF86A23F7C}"/>
+                <a16:creationId xmlns="" xmlns:a16="http://schemas.microsoft.com/office/drawing/2014/main" id="{F418DEA7-7859-4C2C-A524-5CAF86A23F7C}"/>
               </a:ext>
             </a:extLst>
           </p:cNvPr>
@@ -5055,7 +5055,7 @@
           </a:prstGeom>
           <a:ln w="15875">
             <a:solidFill>
-              <a:schemeClr val="accent4">
+              <a:schemeClr val="accent2">
                 <a:alpha val="75000"/>
               </a:schemeClr>
             </a:solidFill>
@@ -5082,7 +5082,7 @@
           <p:cNvPr id="56" name="그림 55">
             <a:extLst>
               <a:ext uri="{FF2B5EF4-FFF2-40B4-BE49-F238E27FC236}">
-                <a16:creationId xmlns:a16="http://schemas.microsoft.com/office/drawing/2014/main" id="{21E306CF-D222-43A3-9876-9F6DD4881499}"/>
+                <a16:creationId xmlns="" xmlns:a16="http://schemas.microsoft.com/office/drawing/2014/main" id="{21E306CF-D222-43A3-9876-9F6DD4881499}"/>
               </a:ext>
             </a:extLst>
           </p:cNvPr>
@@ -5092,7 +5092,7 @@
           <p:nvPr/>
         </p:nvPicPr>
         <p:blipFill>
-          <a:blip r:embed="rId7">
+          <a:blip r:embed="rId7" cstate="print">
             <a:extLst>
               <a:ext uri="{28A0092B-C50C-407E-A947-70E740481C1C}">
                 <a14:useLocalDpi xmlns:a14="http://schemas.microsoft.com/office/drawing/2010/main" val="0"/>
@@ -5118,7 +5118,7 @@
           <p:cNvPr id="72" name="그림 71">
             <a:extLst>
               <a:ext uri="{FF2B5EF4-FFF2-40B4-BE49-F238E27FC236}">
-                <a16:creationId xmlns:a16="http://schemas.microsoft.com/office/drawing/2014/main" id="{18B0AA12-3DC3-4623-ABE7-3164C444DD83}"/>
+                <a16:creationId xmlns="" xmlns:a16="http://schemas.microsoft.com/office/drawing/2014/main" id="{18B0AA12-3DC3-4623-ABE7-3164C444DD83}"/>
               </a:ext>
             </a:extLst>
           </p:cNvPr>
@@ -5128,7 +5128,7 @@
           <p:nvPr/>
         </p:nvPicPr>
         <p:blipFill>
-          <a:blip r:embed="rId8">
+          <a:blip r:embed="rId8" cstate="print">
             <a:extLst>
               <a:ext uri="{28A0092B-C50C-407E-A947-70E740481C1C}">
                 <a14:useLocalDpi xmlns:a14="http://schemas.microsoft.com/office/drawing/2010/main" val="0"/>
@@ -5142,7 +5142,7 @@
         <p:spPr>
           <a:xfrm>
             <a:off x="9919593" y="188241"/>
-            <a:ext cx="1827013" cy="3045022"/>
+            <a:ext cx="1827013" cy="3045021"/>
           </a:xfrm>
           <a:prstGeom prst="rect">
             <a:avLst/>
@@ -5154,7 +5154,7 @@
           <p:cNvPr id="79" name="타원 78">
             <a:extLst>
               <a:ext uri="{FF2B5EF4-FFF2-40B4-BE49-F238E27FC236}">
-                <a16:creationId xmlns:a16="http://schemas.microsoft.com/office/drawing/2014/main" id="{C706B378-0A90-489E-81CE-3BC036877EF7}"/>
+                <a16:creationId xmlns="" xmlns:a16="http://schemas.microsoft.com/office/drawing/2014/main" id="{C706B378-0A90-489E-81CE-3BC036877EF7}"/>
               </a:ext>
             </a:extLst>
           </p:cNvPr>
@@ -5205,10 +5205,10 @@
       </p:sp>
       <p:pic>
         <p:nvPicPr>
-          <p:cNvPr id="84" name="그림 83" descr="스크린샷이(가) 표시된 사진&#10;&#10;자동 생성된 설명">
-            <a:extLst>
-              <a:ext uri="{FF2B5EF4-FFF2-40B4-BE49-F238E27FC236}">
-                <a16:creationId xmlns:a16="http://schemas.microsoft.com/office/drawing/2014/main" id="{18920B3E-8867-494A-8C5D-623838DD01C0}"/>
+          <p:cNvPr id="84" name="그림 83">
+            <a:extLst>
+              <a:ext uri="{FF2B5EF4-FFF2-40B4-BE49-F238E27FC236}">
+                <a16:creationId xmlns="" xmlns:a16="http://schemas.microsoft.com/office/drawing/2014/main" id="{18920B3E-8867-494A-8C5D-623838DD01C0}"/>
               </a:ext>
             </a:extLst>
           </p:cNvPr>
@@ -5218,7 +5218,7 @@
           <p:nvPr/>
         </p:nvPicPr>
         <p:blipFill>
-          <a:blip r:embed="rId9">
+          <a:blip r:embed="rId9" cstate="print">
             <a:extLst>
               <a:ext uri="{28A0092B-C50C-407E-A947-70E740481C1C}">
                 <a14:useLocalDpi xmlns:a14="http://schemas.microsoft.com/office/drawing/2010/main" val="0"/>
@@ -5232,7 +5232,7 @@
         <p:spPr>
           <a:xfrm>
             <a:off x="8761679" y="3625099"/>
-            <a:ext cx="1804079" cy="3006799"/>
+            <a:ext cx="1804079" cy="3006798"/>
           </a:xfrm>
           <a:prstGeom prst="rect">
             <a:avLst/>
@@ -5244,7 +5244,7 @@
           <p:cNvPr id="89" name="타원 88">
             <a:extLst>
               <a:ext uri="{FF2B5EF4-FFF2-40B4-BE49-F238E27FC236}">
-                <a16:creationId xmlns:a16="http://schemas.microsoft.com/office/drawing/2014/main" id="{E57A1DAC-51FD-454C-8C18-5B48FA22AF94}"/>
+                <a16:creationId xmlns="" xmlns:a16="http://schemas.microsoft.com/office/drawing/2014/main" id="{E57A1DAC-51FD-454C-8C18-5B48FA22AF94}"/>
               </a:ext>
             </a:extLst>
           </p:cNvPr>
@@ -5298,7 +5298,7 @@
           <p:cNvPr id="90" name="직선 화살표 연결선 57">
             <a:extLst>
               <a:ext uri="{FF2B5EF4-FFF2-40B4-BE49-F238E27FC236}">
-                <a16:creationId xmlns:a16="http://schemas.microsoft.com/office/drawing/2014/main" id="{2DBA81E3-711F-4FBE-8939-4E9E0A39F896}"/>
+                <a16:creationId xmlns="" xmlns:a16="http://schemas.microsoft.com/office/drawing/2014/main" id="{2DBA81E3-711F-4FBE-8939-4E9E0A39F896}"/>
               </a:ext>
             </a:extLst>
           </p:cNvPr>
@@ -5376,7 +5376,7 @@
           <p:cNvPr id="23" name="그림 22" descr="스크린샷이(가) 표시된 사진&#10;&#10;자동 생성된 설명">
             <a:extLst>
               <a:ext uri="{FF2B5EF4-FFF2-40B4-BE49-F238E27FC236}">
-                <a16:creationId xmlns:a16="http://schemas.microsoft.com/office/drawing/2014/main" id="{7F0F8459-3936-4581-9447-60256BB6D9AF}"/>
+                <a16:creationId xmlns="" xmlns:a16="http://schemas.microsoft.com/office/drawing/2014/main" id="{7F0F8459-3936-4581-9447-60256BB6D9AF}"/>
               </a:ext>
             </a:extLst>
           </p:cNvPr>
@@ -5386,7 +5386,7 @@
           <p:nvPr/>
         </p:nvPicPr>
         <p:blipFill>
-          <a:blip r:embed="rId2">
+          <a:blip r:embed="rId2" cstate="print">
             <a:extLst>
               <a:ext uri="{28A0092B-C50C-407E-A947-70E740481C1C}">
                 <a14:useLocalDpi xmlns:a14="http://schemas.microsoft.com/office/drawing/2010/main" val="0"/>
@@ -5412,7 +5412,7 @@
           <p:cNvPr id="49" name="타원 48">
             <a:extLst>
               <a:ext uri="{FF2B5EF4-FFF2-40B4-BE49-F238E27FC236}">
-                <a16:creationId xmlns:a16="http://schemas.microsoft.com/office/drawing/2014/main" id="{D7155953-6396-41EC-A1C0-17B241825774}"/>
+                <a16:creationId xmlns="" xmlns:a16="http://schemas.microsoft.com/office/drawing/2014/main" id="{D7155953-6396-41EC-A1C0-17B241825774}"/>
               </a:ext>
             </a:extLst>
           </p:cNvPr>
@@ -5466,7 +5466,7 @@
           <p:cNvPr id="32" name="그림 31">
             <a:extLst>
               <a:ext uri="{FF2B5EF4-FFF2-40B4-BE49-F238E27FC236}">
-                <a16:creationId xmlns:a16="http://schemas.microsoft.com/office/drawing/2014/main" id="{57661318-8359-49E3-9D9A-B0432CCAECFA}"/>
+                <a16:creationId xmlns="" xmlns:a16="http://schemas.microsoft.com/office/drawing/2014/main" id="{57661318-8359-49E3-9D9A-B0432CCAECFA}"/>
               </a:ext>
             </a:extLst>
           </p:cNvPr>
@@ -5476,7 +5476,7 @@
           <p:nvPr/>
         </p:nvPicPr>
         <p:blipFill>
-          <a:blip r:embed="rId3">
+          <a:blip r:embed="rId3" cstate="print">
             <a:extLst>
               <a:ext uri="{28A0092B-C50C-407E-A947-70E740481C1C}">
                 <a14:useLocalDpi xmlns:a14="http://schemas.microsoft.com/office/drawing/2010/main" val="0"/>
@@ -5502,7 +5502,7 @@
           <p:cNvPr id="51" name="연결선: 꺾임 50">
             <a:extLst>
               <a:ext uri="{FF2B5EF4-FFF2-40B4-BE49-F238E27FC236}">
-                <a16:creationId xmlns:a16="http://schemas.microsoft.com/office/drawing/2014/main" id="{933D7F78-40F1-479D-BD70-860828377E31}"/>
+                <a16:creationId xmlns="" xmlns:a16="http://schemas.microsoft.com/office/drawing/2014/main" id="{933D7F78-40F1-479D-BD70-860828377E31}"/>
               </a:ext>
             </a:extLst>
           </p:cNvPr>
@@ -5552,7 +5552,7 @@
           <p:cNvPr id="70" name="그림 69" descr="스크린샷이(가) 표시된 사진&#10;&#10;자동 생성된 설명">
             <a:extLst>
               <a:ext uri="{FF2B5EF4-FFF2-40B4-BE49-F238E27FC236}">
-                <a16:creationId xmlns:a16="http://schemas.microsoft.com/office/drawing/2014/main" id="{728C06DC-119B-4319-8DAB-8D35A9B91E88}"/>
+                <a16:creationId xmlns="" xmlns:a16="http://schemas.microsoft.com/office/drawing/2014/main" id="{728C06DC-119B-4319-8DAB-8D35A9B91E88}"/>
               </a:ext>
             </a:extLst>
           </p:cNvPr>
@@ -5562,7 +5562,7 @@
           <p:nvPr/>
         </p:nvPicPr>
         <p:blipFill>
-          <a:blip r:embed="rId4">
+          <a:blip r:embed="rId4" cstate="print">
             <a:extLst>
               <a:ext uri="{28A0092B-C50C-407E-A947-70E740481C1C}">
                 <a14:useLocalDpi xmlns:a14="http://schemas.microsoft.com/office/drawing/2010/main" val="0"/>
@@ -5588,7 +5588,7 @@
           <p:cNvPr id="73" name="그림 72" descr="스크린샷이(가) 표시된 사진&#10;&#10;자동 생성된 설명">
             <a:extLst>
               <a:ext uri="{FF2B5EF4-FFF2-40B4-BE49-F238E27FC236}">
-                <a16:creationId xmlns:a16="http://schemas.microsoft.com/office/drawing/2014/main" id="{A8EB63B4-FED1-4936-BFCA-C4D6BE850D85}"/>
+                <a16:creationId xmlns="" xmlns:a16="http://schemas.microsoft.com/office/drawing/2014/main" id="{A8EB63B4-FED1-4936-BFCA-C4D6BE850D85}"/>
               </a:ext>
             </a:extLst>
           </p:cNvPr>
@@ -5598,7 +5598,7 @@
           <p:nvPr/>
         </p:nvPicPr>
         <p:blipFill>
-          <a:blip r:embed="rId5">
+          <a:blip r:embed="rId5" cstate="print">
             <a:extLst>
               <a:ext uri="{28A0092B-C50C-407E-A947-70E740481C1C}">
                 <a14:useLocalDpi xmlns:a14="http://schemas.microsoft.com/office/drawing/2010/main" val="0"/>
@@ -5624,7 +5624,7 @@
           <p:cNvPr id="79" name="그림 78" descr="스크린샷이(가) 표시된 사진&#10;&#10;자동 생성된 설명">
             <a:extLst>
               <a:ext uri="{FF2B5EF4-FFF2-40B4-BE49-F238E27FC236}">
-                <a16:creationId xmlns:a16="http://schemas.microsoft.com/office/drawing/2014/main" id="{1D16F440-F2DC-46E5-A3BE-DDA459186002}"/>
+                <a16:creationId xmlns="" xmlns:a16="http://schemas.microsoft.com/office/drawing/2014/main" id="{1D16F440-F2DC-46E5-A3BE-DDA459186002}"/>
               </a:ext>
             </a:extLst>
           </p:cNvPr>
@@ -5634,7 +5634,7 @@
           <p:nvPr/>
         </p:nvPicPr>
         <p:blipFill>
-          <a:blip r:embed="rId6">
+          <a:blip r:embed="rId6" cstate="print">
             <a:extLst>
               <a:ext uri="{28A0092B-C50C-407E-A947-70E740481C1C}">
                 <a14:useLocalDpi xmlns:a14="http://schemas.microsoft.com/office/drawing/2010/main" val="0"/>
@@ -5660,7 +5660,7 @@
           <p:cNvPr id="80" name="타원 79">
             <a:extLst>
               <a:ext uri="{FF2B5EF4-FFF2-40B4-BE49-F238E27FC236}">
-                <a16:creationId xmlns:a16="http://schemas.microsoft.com/office/drawing/2014/main" id="{00163942-3696-4D78-AEB1-920B7FAB626B}"/>
+                <a16:creationId xmlns="" xmlns:a16="http://schemas.microsoft.com/office/drawing/2014/main" id="{00163942-3696-4D78-AEB1-920B7FAB626B}"/>
               </a:ext>
             </a:extLst>
           </p:cNvPr>
@@ -5714,7 +5714,7 @@
           <p:cNvPr id="83" name="연결선: 꺾임 82">
             <a:extLst>
               <a:ext uri="{FF2B5EF4-FFF2-40B4-BE49-F238E27FC236}">
-                <a16:creationId xmlns:a16="http://schemas.microsoft.com/office/drawing/2014/main" id="{CF9DFCBD-3AC3-4378-BF2C-B1086562D52C}"/>
+                <a16:creationId xmlns="" xmlns:a16="http://schemas.microsoft.com/office/drawing/2014/main" id="{CF9DFCBD-3AC3-4378-BF2C-B1086562D52C}"/>
               </a:ext>
             </a:extLst>
           </p:cNvPr>
@@ -5760,7 +5760,7 @@
           <p:cNvPr id="87" name="타원 86">
             <a:extLst>
               <a:ext uri="{FF2B5EF4-FFF2-40B4-BE49-F238E27FC236}">
-                <a16:creationId xmlns:a16="http://schemas.microsoft.com/office/drawing/2014/main" id="{2B14E896-CC7B-493E-88AA-011CA449737F}"/>
+                <a16:creationId xmlns="" xmlns:a16="http://schemas.microsoft.com/office/drawing/2014/main" id="{2B14E896-CC7B-493E-88AA-011CA449737F}"/>
               </a:ext>
             </a:extLst>
           </p:cNvPr>
@@ -5814,7 +5814,7 @@
           <p:cNvPr id="88" name="연결선: 꺾임 87">
             <a:extLst>
               <a:ext uri="{FF2B5EF4-FFF2-40B4-BE49-F238E27FC236}">
-                <a16:creationId xmlns:a16="http://schemas.microsoft.com/office/drawing/2014/main" id="{84960DBF-975B-4AD2-8F2E-861A1078117C}"/>
+                <a16:creationId xmlns="" xmlns:a16="http://schemas.microsoft.com/office/drawing/2014/main" id="{84960DBF-975B-4AD2-8F2E-861A1078117C}"/>
               </a:ext>
             </a:extLst>
           </p:cNvPr>
@@ -5864,7 +5864,7 @@
           <p:cNvPr id="92" name="타원 91">
             <a:extLst>
               <a:ext uri="{FF2B5EF4-FFF2-40B4-BE49-F238E27FC236}">
-                <a16:creationId xmlns:a16="http://schemas.microsoft.com/office/drawing/2014/main" id="{0463E310-C052-4E27-B67A-EE2C56BCEA56}"/>
+                <a16:creationId xmlns="" xmlns:a16="http://schemas.microsoft.com/office/drawing/2014/main" id="{0463E310-C052-4E27-B67A-EE2C56BCEA56}"/>
               </a:ext>
             </a:extLst>
           </p:cNvPr>
@@ -5918,7 +5918,7 @@
           <p:cNvPr id="93" name="연결선: 꺾임 92">
             <a:extLst>
               <a:ext uri="{FF2B5EF4-FFF2-40B4-BE49-F238E27FC236}">
-                <a16:creationId xmlns:a16="http://schemas.microsoft.com/office/drawing/2014/main" id="{38C025BB-EF96-4FDA-999C-332A8D941DD1}"/>
+                <a16:creationId xmlns="" xmlns:a16="http://schemas.microsoft.com/office/drawing/2014/main" id="{38C025BB-EF96-4FDA-999C-332A8D941DD1}"/>
               </a:ext>
             </a:extLst>
           </p:cNvPr>
@@ -5968,7 +5968,7 @@
           <p:cNvPr id="97" name="타원 96">
             <a:extLst>
               <a:ext uri="{FF2B5EF4-FFF2-40B4-BE49-F238E27FC236}">
-                <a16:creationId xmlns:a16="http://schemas.microsoft.com/office/drawing/2014/main" id="{2668AFDB-E4F8-4E14-9FF9-1AAD51BC99B6}"/>
+                <a16:creationId xmlns="" xmlns:a16="http://schemas.microsoft.com/office/drawing/2014/main" id="{2668AFDB-E4F8-4E14-9FF9-1AAD51BC99B6}"/>
               </a:ext>
             </a:extLst>
           </p:cNvPr>
@@ -6022,7 +6022,7 @@
           <p:cNvPr id="98" name="연결선: 꺾임 97">
             <a:extLst>
               <a:ext uri="{FF2B5EF4-FFF2-40B4-BE49-F238E27FC236}">
-                <a16:creationId xmlns:a16="http://schemas.microsoft.com/office/drawing/2014/main" id="{130A529D-3D7A-4957-85A3-729320293760}"/>
+                <a16:creationId xmlns="" xmlns:a16="http://schemas.microsoft.com/office/drawing/2014/main" id="{130A529D-3D7A-4957-85A3-729320293760}"/>
               </a:ext>
             </a:extLst>
           </p:cNvPr>
@@ -6070,7 +6070,7 @@
           <p:cNvPr id="102" name="타원 101">
             <a:extLst>
               <a:ext uri="{FF2B5EF4-FFF2-40B4-BE49-F238E27FC236}">
-                <a16:creationId xmlns:a16="http://schemas.microsoft.com/office/drawing/2014/main" id="{035590BC-1B55-4AF7-A61C-BA0B3A458961}"/>
+                <a16:creationId xmlns="" xmlns:a16="http://schemas.microsoft.com/office/drawing/2014/main" id="{035590BC-1B55-4AF7-A61C-BA0B3A458961}"/>
               </a:ext>
             </a:extLst>
           </p:cNvPr>
@@ -6124,7 +6124,7 @@
           <p:cNvPr id="105" name="연결선: 꺾임 104">
             <a:extLst>
               <a:ext uri="{FF2B5EF4-FFF2-40B4-BE49-F238E27FC236}">
-                <a16:creationId xmlns:a16="http://schemas.microsoft.com/office/drawing/2014/main" id="{22769312-F660-49A6-ADD5-9846ADF82BAA}"/>
+                <a16:creationId xmlns="" xmlns:a16="http://schemas.microsoft.com/office/drawing/2014/main" id="{22769312-F660-49A6-ADD5-9846ADF82BAA}"/>
               </a:ext>
             </a:extLst>
           </p:cNvPr>
@@ -6175,7 +6175,7 @@
           <p:cNvPr id="109" name="타원 108">
             <a:extLst>
               <a:ext uri="{FF2B5EF4-FFF2-40B4-BE49-F238E27FC236}">
-                <a16:creationId xmlns:a16="http://schemas.microsoft.com/office/drawing/2014/main" id="{FC28C7AA-78CE-476A-A7DD-A42770906E70}"/>
+                <a16:creationId xmlns="" xmlns:a16="http://schemas.microsoft.com/office/drawing/2014/main" id="{FC28C7AA-78CE-476A-A7DD-A42770906E70}"/>
               </a:ext>
             </a:extLst>
           </p:cNvPr>
@@ -6229,7 +6229,7 @@
           <p:cNvPr id="110" name="연결선: 꺾임 109">
             <a:extLst>
               <a:ext uri="{FF2B5EF4-FFF2-40B4-BE49-F238E27FC236}">
-                <a16:creationId xmlns:a16="http://schemas.microsoft.com/office/drawing/2014/main" id="{1A9182F7-BF02-4B45-A0B6-5CD4FA95C0E6}"/>
+                <a16:creationId xmlns="" xmlns:a16="http://schemas.microsoft.com/office/drawing/2014/main" id="{1A9182F7-BF02-4B45-A0B6-5CD4FA95C0E6}"/>
               </a:ext>
             </a:extLst>
           </p:cNvPr>
@@ -6280,7 +6280,7 @@
           <p:cNvPr id="113" name="타원 112">
             <a:extLst>
               <a:ext uri="{FF2B5EF4-FFF2-40B4-BE49-F238E27FC236}">
-                <a16:creationId xmlns:a16="http://schemas.microsoft.com/office/drawing/2014/main" id="{3B2D081C-2E4C-4952-8954-75B99E69737B}"/>
+                <a16:creationId xmlns="" xmlns:a16="http://schemas.microsoft.com/office/drawing/2014/main" id="{3B2D081C-2E4C-4952-8954-75B99E69737B}"/>
               </a:ext>
             </a:extLst>
           </p:cNvPr>
@@ -6334,7 +6334,7 @@
           <p:cNvPr id="116" name="연결선: 꺾임 115">
             <a:extLst>
               <a:ext uri="{FF2B5EF4-FFF2-40B4-BE49-F238E27FC236}">
-                <a16:creationId xmlns:a16="http://schemas.microsoft.com/office/drawing/2014/main" id="{0B6DB37B-66A0-4A1C-841F-50CC585E56C6}"/>
+                <a16:creationId xmlns="" xmlns:a16="http://schemas.microsoft.com/office/drawing/2014/main" id="{0B6DB37B-66A0-4A1C-841F-50CC585E56C6}"/>
               </a:ext>
             </a:extLst>
           </p:cNvPr>
@@ -6384,7 +6384,7 @@
           <p:cNvPr id="122" name="타원 121">
             <a:extLst>
               <a:ext uri="{FF2B5EF4-FFF2-40B4-BE49-F238E27FC236}">
-                <a16:creationId xmlns:a16="http://schemas.microsoft.com/office/drawing/2014/main" id="{2B40F4CE-EAEA-4A9E-94A8-F5A00A6BF386}"/>
+                <a16:creationId xmlns="" xmlns:a16="http://schemas.microsoft.com/office/drawing/2014/main" id="{2B40F4CE-EAEA-4A9E-94A8-F5A00A6BF386}"/>
               </a:ext>
             </a:extLst>
           </p:cNvPr>
@@ -6438,7 +6438,7 @@
           <p:cNvPr id="123" name="연결선: 꺾임 122">
             <a:extLst>
               <a:ext uri="{FF2B5EF4-FFF2-40B4-BE49-F238E27FC236}">
-                <a16:creationId xmlns:a16="http://schemas.microsoft.com/office/drawing/2014/main" id="{2C62E45A-AAD9-4D64-9D26-9F98A3C3F0E9}"/>
+                <a16:creationId xmlns="" xmlns:a16="http://schemas.microsoft.com/office/drawing/2014/main" id="{2C62E45A-AAD9-4D64-9D26-9F98A3C3F0E9}"/>
               </a:ext>
             </a:extLst>
           </p:cNvPr>
@@ -6488,7 +6488,7 @@
           <p:cNvPr id="153" name="타원 152">
             <a:extLst>
               <a:ext uri="{FF2B5EF4-FFF2-40B4-BE49-F238E27FC236}">
-                <a16:creationId xmlns:a16="http://schemas.microsoft.com/office/drawing/2014/main" id="{226C9918-23B1-4EB2-B47D-746657CE958F}"/>
+                <a16:creationId xmlns="" xmlns:a16="http://schemas.microsoft.com/office/drawing/2014/main" id="{226C9918-23B1-4EB2-B47D-746657CE958F}"/>
               </a:ext>
             </a:extLst>
           </p:cNvPr>
@@ -6542,7 +6542,7 @@
           <p:cNvPr id="154" name="연결선: 꺾임 153">
             <a:extLst>
               <a:ext uri="{FF2B5EF4-FFF2-40B4-BE49-F238E27FC236}">
-                <a16:creationId xmlns:a16="http://schemas.microsoft.com/office/drawing/2014/main" id="{4AC3D237-D569-4E69-9BF6-FDFBCC08141D}"/>
+                <a16:creationId xmlns="" xmlns:a16="http://schemas.microsoft.com/office/drawing/2014/main" id="{4AC3D237-D569-4E69-9BF6-FDFBCC08141D}"/>
               </a:ext>
             </a:extLst>
           </p:cNvPr>
@@ -6592,7 +6592,7 @@
           <p:cNvPr id="160" name="TextBox 159">
             <a:extLst>
               <a:ext uri="{FF2B5EF4-FFF2-40B4-BE49-F238E27FC236}">
-                <a16:creationId xmlns:a16="http://schemas.microsoft.com/office/drawing/2014/main" id="{17D5C6D9-97EE-4E48-95F9-33C56B3AC3FA}"/>
+                <a16:creationId xmlns="" xmlns:a16="http://schemas.microsoft.com/office/drawing/2014/main" id="{17D5C6D9-97EE-4E48-95F9-33C56B3AC3FA}"/>
               </a:ext>
             </a:extLst>
           </p:cNvPr>
@@ -6674,7 +6674,7 @@
           <p:cNvPr id="5" name="그림 4" descr="스크린샷이(가) 표시된 사진&#10;&#10;자동 생성된 설명">
             <a:extLst>
               <a:ext uri="{FF2B5EF4-FFF2-40B4-BE49-F238E27FC236}">
-                <a16:creationId xmlns:a16="http://schemas.microsoft.com/office/drawing/2014/main" id="{2934BC44-3292-48B6-AB5D-9468DFD508B7}"/>
+                <a16:creationId xmlns="" xmlns:a16="http://schemas.microsoft.com/office/drawing/2014/main" id="{2934BC44-3292-48B6-AB5D-9468DFD508B7}"/>
               </a:ext>
             </a:extLst>
           </p:cNvPr>
@@ -6684,7 +6684,7 @@
           <p:nvPr/>
         </p:nvPicPr>
         <p:blipFill>
-          <a:blip r:embed="rId2">
+          <a:blip r:embed="rId2" cstate="print">
             <a:extLst>
               <a:ext uri="{28A0092B-C50C-407E-A947-70E740481C1C}">
                 <a14:useLocalDpi xmlns:a14="http://schemas.microsoft.com/office/drawing/2010/main" val="0"/>
@@ -6710,7 +6710,7 @@
           <p:cNvPr id="8" name="그림 7">
             <a:extLst>
               <a:ext uri="{FF2B5EF4-FFF2-40B4-BE49-F238E27FC236}">
-                <a16:creationId xmlns:a16="http://schemas.microsoft.com/office/drawing/2014/main" id="{0655EE5E-D42C-442E-9AA8-F775A9A3A6EC}"/>
+                <a16:creationId xmlns="" xmlns:a16="http://schemas.microsoft.com/office/drawing/2014/main" id="{0655EE5E-D42C-442E-9AA8-F775A9A3A6EC}"/>
               </a:ext>
             </a:extLst>
           </p:cNvPr>
@@ -6720,7 +6720,7 @@
           <p:nvPr/>
         </p:nvPicPr>
         <p:blipFill>
-          <a:blip r:embed="rId3">
+          <a:blip r:embed="rId3" cstate="print">
             <a:extLst>
               <a:ext uri="{28A0092B-C50C-407E-A947-70E740481C1C}">
                 <a14:useLocalDpi xmlns:a14="http://schemas.microsoft.com/office/drawing/2010/main" val="0"/>
@@ -6746,7 +6746,7 @@
           <p:cNvPr id="10" name="그림 9" descr="스크린샷이(가) 표시된 사진&#10;&#10;자동 생성된 설명">
             <a:extLst>
               <a:ext uri="{FF2B5EF4-FFF2-40B4-BE49-F238E27FC236}">
-                <a16:creationId xmlns:a16="http://schemas.microsoft.com/office/drawing/2014/main" id="{63BE739E-27A6-4D30-87BA-51983477BDE1}"/>
+                <a16:creationId xmlns="" xmlns:a16="http://schemas.microsoft.com/office/drawing/2014/main" id="{63BE739E-27A6-4D30-87BA-51983477BDE1}"/>
               </a:ext>
             </a:extLst>
           </p:cNvPr>
@@ -6756,7 +6756,7 @@
           <p:nvPr/>
         </p:nvPicPr>
         <p:blipFill>
-          <a:blip r:embed="rId4">
+          <a:blip r:embed="rId4" cstate="print">
             <a:extLst>
               <a:ext uri="{28A0092B-C50C-407E-A947-70E740481C1C}">
                 <a14:useLocalDpi xmlns:a14="http://schemas.microsoft.com/office/drawing/2010/main" val="0"/>
@@ -6782,7 +6782,7 @@
           <p:cNvPr id="11" name="타원 10">
             <a:extLst>
               <a:ext uri="{FF2B5EF4-FFF2-40B4-BE49-F238E27FC236}">
-                <a16:creationId xmlns:a16="http://schemas.microsoft.com/office/drawing/2014/main" id="{2628DD41-F7B3-470A-91C4-C33BB341F7B4}"/>
+                <a16:creationId xmlns="" xmlns:a16="http://schemas.microsoft.com/office/drawing/2014/main" id="{2628DD41-F7B3-470A-91C4-C33BB341F7B4}"/>
               </a:ext>
             </a:extLst>
           </p:cNvPr>
@@ -6836,7 +6836,7 @@
           <p:cNvPr id="12" name="연결선: 꺾임 11">
             <a:extLst>
               <a:ext uri="{FF2B5EF4-FFF2-40B4-BE49-F238E27FC236}">
-                <a16:creationId xmlns:a16="http://schemas.microsoft.com/office/drawing/2014/main" id="{889E9816-E5B6-42CB-87A3-771C7CC7C9D6}"/>
+                <a16:creationId xmlns="" xmlns:a16="http://schemas.microsoft.com/office/drawing/2014/main" id="{889E9816-E5B6-42CB-87A3-771C7CC7C9D6}"/>
               </a:ext>
             </a:extLst>
           </p:cNvPr>
@@ -6886,7 +6886,7 @@
           <p:cNvPr id="14" name="타원 13">
             <a:extLst>
               <a:ext uri="{FF2B5EF4-FFF2-40B4-BE49-F238E27FC236}">
-                <a16:creationId xmlns:a16="http://schemas.microsoft.com/office/drawing/2014/main" id="{6456F5A2-A4D0-4644-B1A8-F25D593B0F48}"/>
+                <a16:creationId xmlns="" xmlns:a16="http://schemas.microsoft.com/office/drawing/2014/main" id="{6456F5A2-A4D0-4644-B1A8-F25D593B0F48}"/>
               </a:ext>
             </a:extLst>
           </p:cNvPr>
@@ -6940,7 +6940,7 @@
           <p:cNvPr id="15" name="연결선: 꺾임 14">
             <a:extLst>
               <a:ext uri="{FF2B5EF4-FFF2-40B4-BE49-F238E27FC236}">
-                <a16:creationId xmlns:a16="http://schemas.microsoft.com/office/drawing/2014/main" id="{533AA63A-5F47-4320-8D12-E55725772EE9}"/>
+                <a16:creationId xmlns="" xmlns:a16="http://schemas.microsoft.com/office/drawing/2014/main" id="{533AA63A-5F47-4320-8D12-E55725772EE9}"/>
               </a:ext>
             </a:extLst>
           </p:cNvPr>
@@ -6991,7 +6991,7 @@
           <p:cNvPr id="19" name="타원 18">
             <a:extLst>
               <a:ext uri="{FF2B5EF4-FFF2-40B4-BE49-F238E27FC236}">
-                <a16:creationId xmlns:a16="http://schemas.microsoft.com/office/drawing/2014/main" id="{A68F6C89-FB6D-4A9F-AE71-0B69C35B7207}"/>
+                <a16:creationId xmlns="" xmlns:a16="http://schemas.microsoft.com/office/drawing/2014/main" id="{A68F6C89-FB6D-4A9F-AE71-0B69C35B7207}"/>
               </a:ext>
             </a:extLst>
           </p:cNvPr>
@@ -7045,7 +7045,7 @@
           <p:cNvPr id="20" name="연결선: 꺾임 19">
             <a:extLst>
               <a:ext uri="{FF2B5EF4-FFF2-40B4-BE49-F238E27FC236}">
-                <a16:creationId xmlns:a16="http://schemas.microsoft.com/office/drawing/2014/main" id="{9A433648-87A0-46D3-8A56-4CA543D002F0}"/>
+                <a16:creationId xmlns="" xmlns:a16="http://schemas.microsoft.com/office/drawing/2014/main" id="{9A433648-87A0-46D3-8A56-4CA543D002F0}"/>
               </a:ext>
             </a:extLst>
           </p:cNvPr>
@@ -7095,7 +7095,7 @@
           <p:cNvPr id="25" name="그림 24" descr="스크린샷이(가) 표시된 사진&#10;&#10;자동 생성된 설명">
             <a:extLst>
               <a:ext uri="{FF2B5EF4-FFF2-40B4-BE49-F238E27FC236}">
-                <a16:creationId xmlns:a16="http://schemas.microsoft.com/office/drawing/2014/main" id="{576C8FAD-0773-44B5-B8DE-3437AE00F9F1}"/>
+                <a16:creationId xmlns="" xmlns:a16="http://schemas.microsoft.com/office/drawing/2014/main" id="{576C8FAD-0773-44B5-B8DE-3437AE00F9F1}"/>
               </a:ext>
             </a:extLst>
           </p:cNvPr>
@@ -7105,7 +7105,7 @@
           <p:nvPr/>
         </p:nvPicPr>
         <p:blipFill>
-          <a:blip r:embed="rId5">
+          <a:blip r:embed="rId5" cstate="print">
             <a:extLst>
               <a:ext uri="{28A0092B-C50C-407E-A947-70E740481C1C}">
                 <a14:useLocalDpi xmlns:a14="http://schemas.microsoft.com/office/drawing/2010/main" val="0"/>
@@ -7131,7 +7131,7 @@
           <p:cNvPr id="27" name="타원 26">
             <a:extLst>
               <a:ext uri="{FF2B5EF4-FFF2-40B4-BE49-F238E27FC236}">
-                <a16:creationId xmlns:a16="http://schemas.microsoft.com/office/drawing/2014/main" id="{AF3D5893-27D3-4328-B85E-96D3E5D83C4D}"/>
+                <a16:creationId xmlns="" xmlns:a16="http://schemas.microsoft.com/office/drawing/2014/main" id="{AF3D5893-27D3-4328-B85E-96D3E5D83C4D}"/>
               </a:ext>
             </a:extLst>
           </p:cNvPr>
@@ -7185,7 +7185,7 @@
           <p:cNvPr id="28" name="연결선: 꺾임 27">
             <a:extLst>
               <a:ext uri="{FF2B5EF4-FFF2-40B4-BE49-F238E27FC236}">
-                <a16:creationId xmlns:a16="http://schemas.microsoft.com/office/drawing/2014/main" id="{C3B78DAE-27CB-4E62-BA67-D8F5AD5144EA}"/>
+                <a16:creationId xmlns="" xmlns:a16="http://schemas.microsoft.com/office/drawing/2014/main" id="{C3B78DAE-27CB-4E62-BA67-D8F5AD5144EA}"/>
               </a:ext>
             </a:extLst>
           </p:cNvPr>
@@ -7235,7 +7235,7 @@
           <p:cNvPr id="31" name="TextBox 30">
             <a:extLst>
               <a:ext uri="{FF2B5EF4-FFF2-40B4-BE49-F238E27FC236}">
-                <a16:creationId xmlns:a16="http://schemas.microsoft.com/office/drawing/2014/main" id="{6D330B34-C300-4B4D-BCBA-4A22C1372D50}"/>
+                <a16:creationId xmlns="" xmlns:a16="http://schemas.microsoft.com/office/drawing/2014/main" id="{6D330B34-C300-4B4D-BCBA-4A22C1372D50}"/>
               </a:ext>
             </a:extLst>
           </p:cNvPr>
@@ -7338,7 +7338,7 @@
     </a:clrScheme>
     <a:fontScheme name="Office">
       <a:majorFont>
-        <a:latin typeface="맑은 고딕" panose="020F0302020204030204"/>
+        <a:latin typeface="맑은 고딕"/>
         <a:ea typeface=""/>
         <a:cs typeface=""/>
         <a:font script="Jpan" typeface="游ゴシック Light"/>
@@ -7390,7 +7390,7 @@
         <a:font script="Tfng" typeface="Ebrima"/>
       </a:majorFont>
       <a:minorFont>
-        <a:latin typeface="맑은 고딕" panose="020F0502020204030204"/>
+        <a:latin typeface="맑은 고딕"/>
         <a:ea typeface=""/>
         <a:cs typeface=""/>
         <a:font script="Jpan" typeface="游ゴシック"/>
@@ -7584,7 +7584,7 @@
   <a:extraClrSchemeLst/>
   <a:extLst>
     <a:ext uri="{05A4C25C-085E-4340-85A3-A5531E510DB2}">
-      <thm15:themeFamily xmlns:thm15="http://schemas.microsoft.com/office/thememl/2012/main" name="Office Theme" id="{62F939B6-93AF-4DB8-9C6B-D6C7DFDC589F}" vid="{4A3C46E8-61CC-4603-A589-7422A47A8E4A}"/>
+      <thm15:themeFamily xmlns="" xmlns:thm15="http://schemas.microsoft.com/office/thememl/2012/main" name="Office Theme" id="{62F939B6-93AF-4DB8-9C6B-D6C7DFDC589F}" vid="{4A3C46E8-61CC-4603-A589-7422A47A8E4A}"/>
     </a:ext>
   </a:extLst>
 </a:theme>

</xml_diff>